<commit_message>
Ajuste ppt aulas Python Big Data
</commit_message>
<xml_diff>
--- a/01 Classes/Aula 02 - Python Big Data.pptx
+++ b/01 Classes/Aula 02 - Python Big Data.pptx
@@ -5,17 +5,22 @@
     <p:sldMasterId id="2147483648" r:id="rId1"/>
   </p:sldMasterIdLst>
   <p:notesMasterIdLst>
-    <p:notesMasterId r:id="rId10"/>
+    <p:notesMasterId r:id="rId15"/>
   </p:notesMasterIdLst>
   <p:sldIdLst>
     <p:sldId id="256" r:id="rId2"/>
     <p:sldId id="291" r:id="rId3"/>
     <p:sldId id="331" r:id="rId4"/>
-    <p:sldId id="333" r:id="rId5"/>
-    <p:sldId id="323" r:id="rId6"/>
-    <p:sldId id="334" r:id="rId7"/>
-    <p:sldId id="337" r:id="rId8"/>
-    <p:sldId id="309" r:id="rId9"/>
+    <p:sldId id="342" r:id="rId5"/>
+    <p:sldId id="339" r:id="rId6"/>
+    <p:sldId id="341" r:id="rId7"/>
+    <p:sldId id="340" r:id="rId8"/>
+    <p:sldId id="338" r:id="rId9"/>
+    <p:sldId id="333" r:id="rId10"/>
+    <p:sldId id="323" r:id="rId11"/>
+    <p:sldId id="334" r:id="rId12"/>
+    <p:sldId id="337" r:id="rId13"/>
+    <p:sldId id="309" r:id="rId14"/>
   </p:sldIdLst>
   <p:sldSz cx="9144000" cy="5143500" type="screen16x9"/>
   <p:notesSz cx="6858000" cy="9144000"/>
@@ -562,6 +567,138 @@
 </p:notes>
 </file>
 
+<file path=ppt/notesSlides/notesSlide10.xml><?xml version="1.0" encoding="utf-8"?>
+<p:notes xmlns:a="http://schemas.openxmlformats.org/drawingml/2006/main" xmlns:r="http://schemas.openxmlformats.org/officeDocument/2006/relationships" xmlns:p="http://schemas.openxmlformats.org/presentationml/2006/main">
+  <p:cSld>
+    <p:spTree>
+      <p:nvGrpSpPr>
+        <p:cNvPr id="1" name=""/>
+        <p:cNvGrpSpPr/>
+        <p:nvPr/>
+      </p:nvGrpSpPr>
+      <p:grpSpPr>
+        <a:xfrm>
+          <a:off x="0" y="0"/>
+          <a:ext cx="0" cy="0"/>
+          <a:chOff x="0" y="0"/>
+          <a:chExt cx="0" cy="0"/>
+        </a:xfrm>
+      </p:grpSpPr>
+      <p:sp>
+        <p:nvSpPr>
+          <p:cNvPr id="2" name="Espaço Reservado para Imagem de Slide 1"/>
+          <p:cNvSpPr>
+            <a:spLocks noGrp="1" noRot="1" noChangeAspect="1"/>
+          </p:cNvSpPr>
+          <p:nvPr>
+            <p:ph type="sldImg"/>
+          </p:nvPr>
+        </p:nvSpPr>
+        <p:spPr>
+          <a:xfrm>
+            <a:off x="381000" y="685800"/>
+            <a:ext cx="6096000" cy="3429000"/>
+          </a:xfrm>
+        </p:spPr>
+      </p:sp>
+      <p:sp>
+        <p:nvSpPr>
+          <p:cNvPr id="3" name="Espaço Reservado para Anotações 2"/>
+          <p:cNvSpPr>
+            <a:spLocks noGrp="1"/>
+          </p:cNvSpPr>
+          <p:nvPr>
+            <p:ph type="body" idx="1"/>
+          </p:nvPr>
+        </p:nvSpPr>
+        <p:spPr/>
+        <p:txBody>
+          <a:bodyPr/>
+          <a:lstStyle/>
+          <a:p>
+            <a:endParaRPr lang="pt-BR" dirty="0"/>
+          </a:p>
+        </p:txBody>
+      </p:sp>
+    </p:spTree>
+    <p:extLst>
+      <p:ext uri="{BB962C8B-B14F-4D97-AF65-F5344CB8AC3E}">
+        <p14:creationId xmlns:p14="http://schemas.microsoft.com/office/powerpoint/2010/main" val="2296249050"/>
+      </p:ext>
+    </p:extLst>
+  </p:cSld>
+  <p:clrMapOvr>
+    <a:masterClrMapping/>
+  </p:clrMapOvr>
+</p:notes>
+</file>
+
+<file path=ppt/notesSlides/notesSlide11.xml><?xml version="1.0" encoding="utf-8"?>
+<p:notes xmlns:a="http://schemas.openxmlformats.org/drawingml/2006/main" xmlns:r="http://schemas.openxmlformats.org/officeDocument/2006/relationships" xmlns:p="http://schemas.openxmlformats.org/presentationml/2006/main">
+  <p:cSld>
+    <p:spTree>
+      <p:nvGrpSpPr>
+        <p:cNvPr id="1" name=""/>
+        <p:cNvGrpSpPr/>
+        <p:nvPr/>
+      </p:nvGrpSpPr>
+      <p:grpSpPr>
+        <a:xfrm>
+          <a:off x="0" y="0"/>
+          <a:ext cx="0" cy="0"/>
+          <a:chOff x="0" y="0"/>
+          <a:chExt cx="0" cy="0"/>
+        </a:xfrm>
+      </p:grpSpPr>
+      <p:sp>
+        <p:nvSpPr>
+          <p:cNvPr id="2" name="Espaço Reservado para Imagem de Slide 1"/>
+          <p:cNvSpPr>
+            <a:spLocks noGrp="1" noRot="1" noChangeAspect="1"/>
+          </p:cNvSpPr>
+          <p:nvPr>
+            <p:ph type="sldImg"/>
+          </p:nvPr>
+        </p:nvSpPr>
+        <p:spPr>
+          <a:xfrm>
+            <a:off x="381000" y="685800"/>
+            <a:ext cx="6096000" cy="3429000"/>
+          </a:xfrm>
+        </p:spPr>
+      </p:sp>
+      <p:sp>
+        <p:nvSpPr>
+          <p:cNvPr id="3" name="Espaço Reservado para Anotações 2"/>
+          <p:cNvSpPr>
+            <a:spLocks noGrp="1"/>
+          </p:cNvSpPr>
+          <p:nvPr>
+            <p:ph type="body" idx="1"/>
+          </p:nvPr>
+        </p:nvSpPr>
+        <p:spPr/>
+        <p:txBody>
+          <a:bodyPr/>
+          <a:lstStyle/>
+          <a:p>
+            <a:endParaRPr lang="pt-BR" dirty="0"/>
+          </a:p>
+        </p:txBody>
+      </p:sp>
+    </p:spTree>
+    <p:extLst>
+      <p:ext uri="{BB962C8B-B14F-4D97-AF65-F5344CB8AC3E}">
+        <p14:creationId xmlns:p14="http://schemas.microsoft.com/office/powerpoint/2010/main" val="4290351292"/>
+      </p:ext>
+    </p:extLst>
+  </p:cSld>
+  <p:clrMapOvr>
+    <a:masterClrMapping/>
+  </p:clrMapOvr>
+</p:notes>
+</file>
+
 <file path=ppt/notesSlides/notesSlide2.xml><?xml version="1.0" encoding="utf-8"?>
 <p:notes xmlns:a="http://schemas.openxmlformats.org/drawingml/2006/main" xmlns:r="http://schemas.openxmlformats.org/officeDocument/2006/relationships" xmlns:p="http://schemas.openxmlformats.org/presentationml/2006/main">
   <p:cSld>
@@ -684,7 +821,7 @@
     </p:spTree>
     <p:extLst>
       <p:ext uri="{BB962C8B-B14F-4D97-AF65-F5344CB8AC3E}">
-        <p14:creationId xmlns:p14="http://schemas.microsoft.com/office/powerpoint/2010/main" val="585304384"/>
+        <p14:creationId xmlns:p14="http://schemas.microsoft.com/office/powerpoint/2010/main" val="1380166377"/>
       </p:ext>
     </p:extLst>
   </p:cSld>
@@ -750,7 +887,7 @@
     </p:spTree>
     <p:extLst>
       <p:ext uri="{BB962C8B-B14F-4D97-AF65-F5344CB8AC3E}">
-        <p14:creationId xmlns:p14="http://schemas.microsoft.com/office/powerpoint/2010/main" val="2709569597"/>
+        <p14:creationId xmlns:p14="http://schemas.microsoft.com/office/powerpoint/2010/main" val="3547005873"/>
       </p:ext>
     </p:extLst>
   </p:cSld>
@@ -816,7 +953,7 @@
     </p:spTree>
     <p:extLst>
       <p:ext uri="{BB962C8B-B14F-4D97-AF65-F5344CB8AC3E}">
-        <p14:creationId xmlns:p14="http://schemas.microsoft.com/office/powerpoint/2010/main" val="2296249050"/>
+        <p14:creationId xmlns:p14="http://schemas.microsoft.com/office/powerpoint/2010/main" val="3725471847"/>
       </p:ext>
     </p:extLst>
   </p:cSld>
@@ -882,7 +1019,205 @@
     </p:spTree>
     <p:extLst>
       <p:ext uri="{BB962C8B-B14F-4D97-AF65-F5344CB8AC3E}">
-        <p14:creationId xmlns:p14="http://schemas.microsoft.com/office/powerpoint/2010/main" val="4290351292"/>
+        <p14:creationId xmlns:p14="http://schemas.microsoft.com/office/powerpoint/2010/main" val="1946933886"/>
+      </p:ext>
+    </p:extLst>
+  </p:cSld>
+  <p:clrMapOvr>
+    <a:masterClrMapping/>
+  </p:clrMapOvr>
+</p:notes>
+</file>
+
+<file path=ppt/notesSlides/notesSlide7.xml><?xml version="1.0" encoding="utf-8"?>
+<p:notes xmlns:a="http://schemas.openxmlformats.org/drawingml/2006/main" xmlns:r="http://schemas.openxmlformats.org/officeDocument/2006/relationships" xmlns:p="http://schemas.openxmlformats.org/presentationml/2006/main">
+  <p:cSld>
+    <p:spTree>
+      <p:nvGrpSpPr>
+        <p:cNvPr id="1" name=""/>
+        <p:cNvGrpSpPr/>
+        <p:nvPr/>
+      </p:nvGrpSpPr>
+      <p:grpSpPr>
+        <a:xfrm>
+          <a:off x="0" y="0"/>
+          <a:ext cx="0" cy="0"/>
+          <a:chOff x="0" y="0"/>
+          <a:chExt cx="0" cy="0"/>
+        </a:xfrm>
+      </p:grpSpPr>
+      <p:sp>
+        <p:nvSpPr>
+          <p:cNvPr id="2" name="Espaço Reservado para Imagem de Slide 1"/>
+          <p:cNvSpPr>
+            <a:spLocks noGrp="1" noRot="1" noChangeAspect="1"/>
+          </p:cNvSpPr>
+          <p:nvPr>
+            <p:ph type="sldImg"/>
+          </p:nvPr>
+        </p:nvSpPr>
+        <p:spPr>
+          <a:xfrm>
+            <a:off x="381000" y="685800"/>
+            <a:ext cx="6096000" cy="3429000"/>
+          </a:xfrm>
+        </p:spPr>
+      </p:sp>
+      <p:sp>
+        <p:nvSpPr>
+          <p:cNvPr id="3" name="Espaço Reservado para Anotações 2"/>
+          <p:cNvSpPr>
+            <a:spLocks noGrp="1"/>
+          </p:cNvSpPr>
+          <p:nvPr>
+            <p:ph type="body" idx="1"/>
+          </p:nvPr>
+        </p:nvSpPr>
+        <p:spPr/>
+        <p:txBody>
+          <a:bodyPr/>
+          <a:lstStyle/>
+          <a:p>
+            <a:endParaRPr lang="pt-BR" dirty="0"/>
+          </a:p>
+        </p:txBody>
+      </p:sp>
+    </p:spTree>
+    <p:extLst>
+      <p:ext uri="{BB962C8B-B14F-4D97-AF65-F5344CB8AC3E}">
+        <p14:creationId xmlns:p14="http://schemas.microsoft.com/office/powerpoint/2010/main" val="701530759"/>
+      </p:ext>
+    </p:extLst>
+  </p:cSld>
+  <p:clrMapOvr>
+    <a:masterClrMapping/>
+  </p:clrMapOvr>
+</p:notes>
+</file>
+
+<file path=ppt/notesSlides/notesSlide8.xml><?xml version="1.0" encoding="utf-8"?>
+<p:notes xmlns:a="http://schemas.openxmlformats.org/drawingml/2006/main" xmlns:r="http://schemas.openxmlformats.org/officeDocument/2006/relationships" xmlns:p="http://schemas.openxmlformats.org/presentationml/2006/main">
+  <p:cSld>
+    <p:spTree>
+      <p:nvGrpSpPr>
+        <p:cNvPr id="1" name=""/>
+        <p:cNvGrpSpPr/>
+        <p:nvPr/>
+      </p:nvGrpSpPr>
+      <p:grpSpPr>
+        <a:xfrm>
+          <a:off x="0" y="0"/>
+          <a:ext cx="0" cy="0"/>
+          <a:chOff x="0" y="0"/>
+          <a:chExt cx="0" cy="0"/>
+        </a:xfrm>
+      </p:grpSpPr>
+      <p:sp>
+        <p:nvSpPr>
+          <p:cNvPr id="2" name="Espaço Reservado para Imagem de Slide 1"/>
+          <p:cNvSpPr>
+            <a:spLocks noGrp="1" noRot="1" noChangeAspect="1"/>
+          </p:cNvSpPr>
+          <p:nvPr>
+            <p:ph type="sldImg"/>
+          </p:nvPr>
+        </p:nvSpPr>
+        <p:spPr>
+          <a:xfrm>
+            <a:off x="381000" y="685800"/>
+            <a:ext cx="6096000" cy="3429000"/>
+          </a:xfrm>
+        </p:spPr>
+      </p:sp>
+      <p:sp>
+        <p:nvSpPr>
+          <p:cNvPr id="3" name="Espaço Reservado para Anotações 2"/>
+          <p:cNvSpPr>
+            <a:spLocks noGrp="1"/>
+          </p:cNvSpPr>
+          <p:nvPr>
+            <p:ph type="body" idx="1"/>
+          </p:nvPr>
+        </p:nvSpPr>
+        <p:spPr/>
+        <p:txBody>
+          <a:bodyPr/>
+          <a:lstStyle/>
+          <a:p>
+            <a:endParaRPr lang="pt-BR" dirty="0"/>
+          </a:p>
+        </p:txBody>
+      </p:sp>
+    </p:spTree>
+    <p:extLst>
+      <p:ext uri="{BB962C8B-B14F-4D97-AF65-F5344CB8AC3E}">
+        <p14:creationId xmlns:p14="http://schemas.microsoft.com/office/powerpoint/2010/main" val="585304384"/>
+      </p:ext>
+    </p:extLst>
+  </p:cSld>
+  <p:clrMapOvr>
+    <a:masterClrMapping/>
+  </p:clrMapOvr>
+</p:notes>
+</file>
+
+<file path=ppt/notesSlides/notesSlide9.xml><?xml version="1.0" encoding="utf-8"?>
+<p:notes xmlns:a="http://schemas.openxmlformats.org/drawingml/2006/main" xmlns:r="http://schemas.openxmlformats.org/officeDocument/2006/relationships" xmlns:p="http://schemas.openxmlformats.org/presentationml/2006/main">
+  <p:cSld>
+    <p:spTree>
+      <p:nvGrpSpPr>
+        <p:cNvPr id="1" name=""/>
+        <p:cNvGrpSpPr/>
+        <p:nvPr/>
+      </p:nvGrpSpPr>
+      <p:grpSpPr>
+        <a:xfrm>
+          <a:off x="0" y="0"/>
+          <a:ext cx="0" cy="0"/>
+          <a:chOff x="0" y="0"/>
+          <a:chExt cx="0" cy="0"/>
+        </a:xfrm>
+      </p:grpSpPr>
+      <p:sp>
+        <p:nvSpPr>
+          <p:cNvPr id="2" name="Espaço Reservado para Imagem de Slide 1"/>
+          <p:cNvSpPr>
+            <a:spLocks noGrp="1" noRot="1" noChangeAspect="1"/>
+          </p:cNvSpPr>
+          <p:nvPr>
+            <p:ph type="sldImg"/>
+          </p:nvPr>
+        </p:nvSpPr>
+        <p:spPr>
+          <a:xfrm>
+            <a:off x="381000" y="685800"/>
+            <a:ext cx="6096000" cy="3429000"/>
+          </a:xfrm>
+        </p:spPr>
+      </p:sp>
+      <p:sp>
+        <p:nvSpPr>
+          <p:cNvPr id="3" name="Espaço Reservado para Anotações 2"/>
+          <p:cNvSpPr>
+            <a:spLocks noGrp="1"/>
+          </p:cNvSpPr>
+          <p:nvPr>
+            <p:ph type="body" idx="1"/>
+          </p:nvPr>
+        </p:nvSpPr>
+        <p:spPr/>
+        <p:txBody>
+          <a:bodyPr/>
+          <a:lstStyle/>
+          <a:p>
+            <a:endParaRPr lang="pt-BR" dirty="0"/>
+          </a:p>
+        </p:txBody>
+      </p:sp>
+    </p:spTree>
+    <p:extLst>
+      <p:ext uri="{BB962C8B-B14F-4D97-AF65-F5344CB8AC3E}">
+        <p14:creationId xmlns:p14="http://schemas.microsoft.com/office/powerpoint/2010/main" val="2709569597"/>
       </p:ext>
     </p:extLst>
   </p:cSld>
@@ -3829,6 +4164,995 @@
 </p:sld>
 </file>
 
+<file path=ppt/slides/slide10.xml><?xml version="1.0" encoding="utf-8"?>
+<p:sld xmlns:a="http://schemas.openxmlformats.org/drawingml/2006/main" xmlns:r="http://schemas.openxmlformats.org/officeDocument/2006/relationships" xmlns:p="http://schemas.openxmlformats.org/presentationml/2006/main">
+  <p:cSld>
+    <p:spTree>
+      <p:nvGrpSpPr>
+        <p:cNvPr id="1" name=""/>
+        <p:cNvGrpSpPr/>
+        <p:nvPr/>
+      </p:nvGrpSpPr>
+      <p:grpSpPr>
+        <a:xfrm>
+          <a:off x="0" y="0"/>
+          <a:ext cx="0" cy="0"/>
+          <a:chOff x="0" y="0"/>
+          <a:chExt cx="0" cy="0"/>
+        </a:xfrm>
+      </p:grpSpPr>
+      <p:sp>
+        <p:nvSpPr>
+          <p:cNvPr id="6" name="Title 1"/>
+          <p:cNvSpPr>
+            <a:spLocks noGrp="1"/>
+          </p:cNvSpPr>
+          <p:nvPr>
+            <p:ph type="title"/>
+          </p:nvPr>
+        </p:nvSpPr>
+        <p:spPr>
+          <a:xfrm>
+            <a:off x="457200" y="205980"/>
+            <a:ext cx="8229600" cy="857251"/>
+          </a:xfrm>
+        </p:spPr>
+        <p:txBody>
+          <a:bodyPr>
+            <a:normAutofit/>
+          </a:bodyPr>
+          <a:lstStyle/>
+          <a:p>
+            <a:r>
+              <a:rPr lang="en-US" b="1" dirty="0" err="1">
+                <a:solidFill>
+                  <a:srgbClr val="0070C0"/>
+                </a:solidFill>
+              </a:rPr>
+              <a:t>Aprenda</a:t>
+            </a:r>
+            <a:r>
+              <a:rPr lang="en-US" b="1" dirty="0">
+                <a:solidFill>
+                  <a:srgbClr val="0070C0"/>
+                </a:solidFill>
+              </a:rPr>
+              <a:t>+</a:t>
+            </a:r>
+          </a:p>
+        </p:txBody>
+      </p:sp>
+      <p:sp>
+        <p:nvSpPr>
+          <p:cNvPr id="8" name="Text Placeholder 2"/>
+          <p:cNvSpPr>
+            <a:spLocks noGrp="1"/>
+          </p:cNvSpPr>
+          <p:nvPr>
+            <p:ph type="body" sz="half" idx="1"/>
+          </p:nvPr>
+        </p:nvSpPr>
+        <p:spPr>
+          <a:xfrm>
+            <a:off x="142865" y="1200150"/>
+            <a:ext cx="8865056" cy="3737370"/>
+          </a:xfrm>
+        </p:spPr>
+        <p:txBody>
+          <a:bodyPr>
+            <a:noAutofit/>
+          </a:bodyPr>
+          <a:lstStyle/>
+          <a:p>
+            <a:pPr marL="0" indent="0" algn="just">
+              <a:buNone/>
+            </a:pPr>
+            <a:endParaRPr lang="pt-BR" sz="2400" dirty="0">
+              <a:latin typeface="Times New Roman" panose="02020603050405020304" pitchFamily="18" charset="0"/>
+              <a:cs typeface="Times New Roman" panose="02020603050405020304" pitchFamily="18" charset="0"/>
+            </a:endParaRPr>
+          </a:p>
+          <a:p>
+            <a:pPr marL="0" indent="0" algn="just">
+              <a:buNone/>
+            </a:pPr>
+            <a:endParaRPr lang="pt-BR" sz="2400" dirty="0">
+              <a:latin typeface="Times New Roman" panose="02020603050405020304" pitchFamily="18" charset="0"/>
+              <a:cs typeface="Times New Roman" panose="02020603050405020304" pitchFamily="18" charset="0"/>
+            </a:endParaRPr>
+          </a:p>
+          <a:p>
+            <a:pPr marL="0" indent="0" algn="just">
+              <a:buNone/>
+            </a:pPr>
+            <a:r>
+              <a:rPr lang="pt-BR" sz="2400" dirty="0">
+                <a:latin typeface="Times New Roman" panose="02020603050405020304" pitchFamily="18" charset="0"/>
+                <a:cs typeface="Times New Roman" panose="02020603050405020304" pitchFamily="18" charset="0"/>
+              </a:rPr>
+              <a:t>[1] Análise de Dados em Python</a:t>
+            </a:r>
+          </a:p>
+          <a:p>
+            <a:pPr marL="0" indent="0" algn="just">
+              <a:buNone/>
+            </a:pPr>
+            <a:r>
+              <a:rPr lang="pt-BR" sz="2400" b="1" dirty="0">
+                <a:solidFill>
+                  <a:srgbClr val="FF0000"/>
+                </a:solidFill>
+                <a:latin typeface="Times New Roman" panose="02020603050405020304" pitchFamily="18" charset="0"/>
+                <a:cs typeface="Times New Roman" panose="02020603050405020304" pitchFamily="18" charset="0"/>
+              </a:rPr>
+              <a:t>Disponível em: </a:t>
+            </a:r>
+            <a:r>
+              <a:rPr lang="pt-BR" sz="2400" dirty="0">
+                <a:latin typeface="Times New Roman" panose="02020603050405020304" pitchFamily="18" charset="0"/>
+                <a:cs typeface="Times New Roman" panose="02020603050405020304" pitchFamily="18" charset="0"/>
+                <a:hlinkClick r:id="rId3"/>
+              </a:rPr>
+              <a:t>https://youtu.be/W_Bz7M91R1Q</a:t>
+            </a:r>
+            <a:r>
+              <a:rPr lang="pt-BR" sz="2400" dirty="0">
+                <a:latin typeface="Times New Roman" panose="02020603050405020304" pitchFamily="18" charset="0"/>
+                <a:cs typeface="Times New Roman" panose="02020603050405020304" pitchFamily="18" charset="0"/>
+              </a:rPr>
+              <a:t> </a:t>
+            </a:r>
+          </a:p>
+          <a:p>
+            <a:pPr marL="0" indent="0" algn="just">
+              <a:buNone/>
+            </a:pPr>
+            <a:endParaRPr lang="pt-BR" sz="2400" dirty="0">
+              <a:latin typeface="Times New Roman" panose="02020603050405020304" pitchFamily="18" charset="0"/>
+              <a:cs typeface="Times New Roman" panose="02020603050405020304" pitchFamily="18" charset="0"/>
+            </a:endParaRPr>
+          </a:p>
+        </p:txBody>
+      </p:sp>
+    </p:spTree>
+    <p:extLst>
+      <p:ext uri="{BB962C8B-B14F-4D97-AF65-F5344CB8AC3E}">
+        <p14:creationId xmlns:p14="http://schemas.microsoft.com/office/powerpoint/2010/main" val="2747596967"/>
+      </p:ext>
+    </p:extLst>
+  </p:cSld>
+  <p:clrMapOvr>
+    <a:masterClrMapping/>
+  </p:clrMapOvr>
+  <p:transition spd="med"/>
+</p:sld>
+</file>
+
+<file path=ppt/slides/slide11.xml><?xml version="1.0" encoding="utf-8"?>
+<p:sld xmlns:a="http://schemas.openxmlformats.org/drawingml/2006/main" xmlns:r="http://schemas.openxmlformats.org/officeDocument/2006/relationships" xmlns:p="http://schemas.openxmlformats.org/presentationml/2006/main">
+  <p:cSld>
+    <p:spTree>
+      <p:nvGrpSpPr>
+        <p:cNvPr id="1" name=""/>
+        <p:cNvGrpSpPr/>
+        <p:nvPr/>
+      </p:nvGrpSpPr>
+      <p:grpSpPr>
+        <a:xfrm>
+          <a:off x="0" y="0"/>
+          <a:ext cx="0" cy="0"/>
+          <a:chOff x="0" y="0"/>
+          <a:chExt cx="0" cy="0"/>
+        </a:xfrm>
+      </p:grpSpPr>
+      <p:sp>
+        <p:nvSpPr>
+          <p:cNvPr id="6" name="Title 1"/>
+          <p:cNvSpPr>
+            <a:spLocks noGrp="1"/>
+          </p:cNvSpPr>
+          <p:nvPr>
+            <p:ph type="title"/>
+          </p:nvPr>
+        </p:nvSpPr>
+        <p:spPr>
+          <a:xfrm>
+            <a:off x="457200" y="205980"/>
+            <a:ext cx="8229600" cy="857251"/>
+          </a:xfrm>
+        </p:spPr>
+        <p:txBody>
+          <a:bodyPr>
+            <a:normAutofit/>
+          </a:bodyPr>
+          <a:lstStyle/>
+          <a:p>
+            <a:r>
+              <a:rPr lang="en-US" b="1" dirty="0" err="1">
+                <a:solidFill>
+                  <a:srgbClr val="0070C0"/>
+                </a:solidFill>
+              </a:rPr>
+              <a:t>Dinâmica</a:t>
+            </a:r>
+            <a:r>
+              <a:rPr lang="en-US" b="1" dirty="0">
+                <a:solidFill>
+                  <a:srgbClr val="0070C0"/>
+                </a:solidFill>
+              </a:rPr>
+              <a:t>/</a:t>
+            </a:r>
+            <a:r>
+              <a:rPr lang="en-US" b="1" dirty="0" err="1">
+                <a:solidFill>
+                  <a:srgbClr val="0070C0"/>
+                </a:solidFill>
+              </a:rPr>
+              <a:t>Atividades</a:t>
+            </a:r>
+            <a:endParaRPr lang="en-US" b="1" dirty="0">
+              <a:solidFill>
+                <a:srgbClr val="0070C0"/>
+              </a:solidFill>
+            </a:endParaRPr>
+          </a:p>
+        </p:txBody>
+      </p:sp>
+      <p:sp>
+        <p:nvSpPr>
+          <p:cNvPr id="8" name="Text Placeholder 2"/>
+          <p:cNvSpPr>
+            <a:spLocks noGrp="1"/>
+          </p:cNvSpPr>
+          <p:nvPr>
+            <p:ph type="body" sz="half" idx="1"/>
+          </p:nvPr>
+        </p:nvSpPr>
+        <p:spPr>
+          <a:xfrm>
+            <a:off x="139472" y="1063230"/>
+            <a:ext cx="8865056" cy="3606305"/>
+          </a:xfrm>
+        </p:spPr>
+        <p:txBody>
+          <a:bodyPr>
+            <a:noAutofit/>
+          </a:bodyPr>
+          <a:lstStyle/>
+          <a:p>
+            <a:pPr algn="just">
+              <a:buFont typeface="Wingdings" panose="05000000000000000000" pitchFamily="2" charset="2"/>
+              <a:buChar char="§"/>
+            </a:pPr>
+            <a:r>
+              <a:rPr lang="pt-BR" dirty="0">
+                <a:latin typeface="Times New Roman" panose="02020603050405020304" pitchFamily="18" charset="0"/>
+                <a:cs typeface="Times New Roman" panose="02020603050405020304" pitchFamily="18" charset="0"/>
+              </a:rPr>
+              <a:t>	</a:t>
+            </a:r>
+            <a:r>
+              <a:rPr lang="pt-BR" sz="2400" dirty="0">
+                <a:latin typeface="Times New Roman" panose="02020603050405020304" pitchFamily="18" charset="0"/>
+                <a:cs typeface="Times New Roman" panose="02020603050405020304" pitchFamily="18" charset="0"/>
+              </a:rPr>
+              <a:t>Exercícios (Atividade Verificadora de Aprendizagem)</a:t>
+            </a:r>
+          </a:p>
+          <a:p>
+            <a:pPr marL="0" indent="0" algn="just">
+              <a:buNone/>
+            </a:pPr>
+            <a:endParaRPr lang="pt-BR" sz="2400" dirty="0">
+              <a:latin typeface="Times New Roman" panose="02020603050405020304" pitchFamily="18" charset="0"/>
+              <a:cs typeface="Times New Roman" panose="02020603050405020304" pitchFamily="18" charset="0"/>
+            </a:endParaRPr>
+          </a:p>
+          <a:p>
+            <a:pPr marL="0" indent="0" algn="just">
+              <a:buNone/>
+            </a:pPr>
+            <a:endParaRPr lang="pt-BR" sz="2400" dirty="0">
+              <a:latin typeface="Times New Roman" panose="02020603050405020304" pitchFamily="18" charset="0"/>
+              <a:cs typeface="Times New Roman" panose="02020603050405020304" pitchFamily="18" charset="0"/>
+            </a:endParaRPr>
+          </a:p>
+          <a:p>
+            <a:pPr marL="0" indent="0" algn="just">
+              <a:buNone/>
+            </a:pPr>
+            <a:r>
+              <a:rPr lang="pt-BR" sz="2400" b="1" dirty="0">
+                <a:latin typeface="Times New Roman" panose="02020603050405020304" pitchFamily="18" charset="0"/>
+                <a:cs typeface="Times New Roman" panose="02020603050405020304" pitchFamily="18" charset="0"/>
+              </a:rPr>
+              <a:t>IDE</a:t>
+            </a:r>
+            <a:r>
+              <a:rPr lang="pt-BR" sz="2400" dirty="0">
+                <a:latin typeface="Times New Roman" panose="02020603050405020304" pitchFamily="18" charset="0"/>
+                <a:cs typeface="Times New Roman" panose="02020603050405020304" pitchFamily="18" charset="0"/>
+              </a:rPr>
+              <a:t>: Google COLAB</a:t>
+            </a:r>
+          </a:p>
+          <a:p>
+            <a:pPr marL="0" indent="0" algn="just">
+              <a:buNone/>
+            </a:pPr>
+            <a:r>
+              <a:rPr lang="pt-BR" dirty="0">
+                <a:latin typeface="Times New Roman" panose="02020603050405020304" pitchFamily="18" charset="0"/>
+                <a:cs typeface="Times New Roman" panose="02020603050405020304" pitchFamily="18" charset="0"/>
+              </a:rPr>
+              <a:t> </a:t>
+            </a:r>
+            <a:r>
+              <a:rPr lang="pt-BR" sz="2400" dirty="0">
+                <a:latin typeface="Times New Roman" panose="02020603050405020304" pitchFamily="18" charset="0"/>
+                <a:cs typeface="Times New Roman" panose="02020603050405020304" pitchFamily="18" charset="0"/>
+              </a:rPr>
+              <a:t>	</a:t>
+            </a:r>
+          </a:p>
+          <a:p>
+            <a:pPr marL="0" indent="0" algn="just">
+              <a:buNone/>
+            </a:pPr>
+            <a:endParaRPr lang="pt-BR" sz="2000" dirty="0">
+              <a:latin typeface="Calibri" panose="020F0502020204030204" pitchFamily="34" charset="0"/>
+            </a:endParaRPr>
+          </a:p>
+        </p:txBody>
+      </p:sp>
+    </p:spTree>
+    <p:extLst>
+      <p:ext uri="{BB962C8B-B14F-4D97-AF65-F5344CB8AC3E}">
+        <p14:creationId xmlns:p14="http://schemas.microsoft.com/office/powerpoint/2010/main" val="2470652989"/>
+      </p:ext>
+    </p:extLst>
+  </p:cSld>
+  <p:clrMapOvr>
+    <a:masterClrMapping/>
+  </p:clrMapOvr>
+  <p:transition spd="med"/>
+</p:sld>
+</file>
+
+<file path=ppt/slides/slide12.xml><?xml version="1.0" encoding="utf-8"?>
+<p:sld xmlns:a="http://schemas.openxmlformats.org/drawingml/2006/main" xmlns:r="http://schemas.openxmlformats.org/officeDocument/2006/relationships" xmlns:p="http://schemas.openxmlformats.org/presentationml/2006/main">
+  <p:cSld>
+    <p:spTree>
+      <p:nvGrpSpPr>
+        <p:cNvPr id="1" name=""/>
+        <p:cNvGrpSpPr/>
+        <p:nvPr/>
+      </p:nvGrpSpPr>
+      <p:grpSpPr>
+        <a:xfrm>
+          <a:off x="0" y="0"/>
+          <a:ext cx="0" cy="0"/>
+          <a:chOff x="0" y="0"/>
+          <a:chExt cx="0" cy="0"/>
+        </a:xfrm>
+      </p:grpSpPr>
+      <p:sp>
+        <p:nvSpPr>
+          <p:cNvPr id="6" name="Title 1"/>
+          <p:cNvSpPr>
+            <a:spLocks noGrp="1"/>
+          </p:cNvSpPr>
+          <p:nvPr>
+            <p:ph type="title"/>
+          </p:nvPr>
+        </p:nvSpPr>
+        <p:spPr>
+          <a:xfrm>
+            <a:off x="457200" y="205980"/>
+            <a:ext cx="8229600" cy="857251"/>
+          </a:xfrm>
+        </p:spPr>
+        <p:txBody>
+          <a:bodyPr>
+            <a:normAutofit/>
+          </a:bodyPr>
+          <a:lstStyle/>
+          <a:p>
+            <a:r>
+              <a:rPr lang="en-US" b="1" dirty="0" err="1">
+                <a:solidFill>
+                  <a:srgbClr val="0070C0"/>
+                </a:solidFill>
+              </a:rPr>
+              <a:t>Referências</a:t>
+            </a:r>
+            <a:r>
+              <a:rPr lang="en-US" b="1" dirty="0">
+                <a:solidFill>
+                  <a:srgbClr val="0070C0"/>
+                </a:solidFill>
+              </a:rPr>
+              <a:t> </a:t>
+            </a:r>
+            <a:r>
+              <a:rPr lang="en-US" b="1" dirty="0" err="1">
+                <a:solidFill>
+                  <a:srgbClr val="0070C0"/>
+                </a:solidFill>
+              </a:rPr>
+              <a:t>Bibliográficas</a:t>
+            </a:r>
+            <a:endParaRPr lang="en-US" b="1" dirty="0">
+              <a:solidFill>
+                <a:srgbClr val="0070C0"/>
+              </a:solidFill>
+            </a:endParaRPr>
+          </a:p>
+        </p:txBody>
+      </p:sp>
+      <p:sp>
+        <p:nvSpPr>
+          <p:cNvPr id="8" name="Text Placeholder 2"/>
+          <p:cNvSpPr>
+            <a:spLocks noGrp="1"/>
+          </p:cNvSpPr>
+          <p:nvPr>
+            <p:ph type="body" sz="half" idx="1"/>
+          </p:nvPr>
+        </p:nvSpPr>
+        <p:spPr>
+          <a:xfrm>
+            <a:off x="142865" y="1200151"/>
+            <a:ext cx="8865056" cy="3394472"/>
+          </a:xfrm>
+        </p:spPr>
+        <p:txBody>
+          <a:bodyPr>
+            <a:noAutofit/>
+          </a:bodyPr>
+          <a:lstStyle/>
+          <a:p>
+            <a:pPr marL="0" indent="0" algn="just">
+              <a:buNone/>
+            </a:pPr>
+            <a:r>
+              <a:rPr lang="pt-BR" sz="2000" dirty="0">
+                <a:latin typeface="Times New Roman" panose="02020603050405020304" pitchFamily="18" charset="0"/>
+                <a:cs typeface="Times New Roman" panose="02020603050405020304" pitchFamily="18" charset="0"/>
+              </a:rPr>
+              <a:t>[1] </a:t>
+            </a:r>
+            <a:r>
+              <a:rPr lang="pt-BR" sz="2000" b="1" dirty="0">
+                <a:latin typeface="Times New Roman" panose="02020603050405020304" pitchFamily="18" charset="0"/>
+                <a:cs typeface="Times New Roman" panose="02020603050405020304" pitchFamily="18" charset="0"/>
+              </a:rPr>
+              <a:t>CHIAVEGATTO FILHO, Alexandre Dias Porto</a:t>
+            </a:r>
+            <a:r>
+              <a:rPr lang="pt-BR" sz="2000" dirty="0">
+                <a:latin typeface="Times New Roman" panose="02020603050405020304" pitchFamily="18" charset="0"/>
+                <a:cs typeface="Times New Roman" panose="02020603050405020304" pitchFamily="18" charset="0"/>
+              </a:rPr>
+              <a:t>. Uso de big data em saúde no Brasil: perspectivas para um futuro próximo. Epidemiologia e Serviços de Saúde, v. 24, p. 325-332, 2015.</a:t>
+            </a:r>
+          </a:p>
+          <a:p>
+            <a:pPr marL="0" indent="0" algn="just">
+              <a:buNone/>
+            </a:pPr>
+            <a:endParaRPr lang="pt-BR" sz="2000" dirty="0">
+              <a:latin typeface="Times New Roman" panose="02020603050405020304" pitchFamily="18" charset="0"/>
+              <a:cs typeface="Times New Roman" panose="02020603050405020304" pitchFamily="18" charset="0"/>
+            </a:endParaRPr>
+          </a:p>
+          <a:p>
+            <a:pPr marL="0" indent="0" algn="just">
+              <a:buNone/>
+            </a:pPr>
+            <a:r>
+              <a:rPr lang="pt-BR" sz="2000" dirty="0">
+                <a:latin typeface="Times New Roman" panose="02020603050405020304" pitchFamily="18" charset="0"/>
+                <a:cs typeface="Times New Roman" panose="02020603050405020304" pitchFamily="18" charset="0"/>
+              </a:rPr>
+              <a:t>[2] </a:t>
+            </a:r>
+            <a:r>
+              <a:rPr lang="pt-BR" sz="2000" b="1" dirty="0">
+                <a:latin typeface="Times New Roman" panose="02020603050405020304" pitchFamily="18" charset="0"/>
+                <a:cs typeface="Times New Roman" panose="02020603050405020304" pitchFamily="18" charset="0"/>
+              </a:rPr>
+              <a:t>FRANÇA, Tiago Cruz et al</a:t>
+            </a:r>
+            <a:r>
+              <a:rPr lang="pt-BR" sz="2000" dirty="0">
+                <a:latin typeface="Times New Roman" panose="02020603050405020304" pitchFamily="18" charset="0"/>
+                <a:cs typeface="Times New Roman" panose="02020603050405020304" pitchFamily="18" charset="0"/>
+              </a:rPr>
+              <a:t>. Big Social Data: princípios sobre coleta, tratamento e análise de dados sociais. XXIX Simpósio Brasileiro de Banco de Dados–SBBD, v. 14, 2014.</a:t>
+            </a:r>
+          </a:p>
+          <a:p>
+            <a:pPr marL="0" indent="0" algn="just">
+              <a:buNone/>
+            </a:pPr>
+            <a:endParaRPr lang="pt-BR" sz="2000" dirty="0">
+              <a:latin typeface="Times New Roman" panose="02020603050405020304" pitchFamily="18" charset="0"/>
+              <a:cs typeface="Times New Roman" panose="02020603050405020304" pitchFamily="18" charset="0"/>
+            </a:endParaRPr>
+          </a:p>
+        </p:txBody>
+      </p:sp>
+    </p:spTree>
+    <p:extLst>
+      <p:ext uri="{BB962C8B-B14F-4D97-AF65-F5344CB8AC3E}">
+        <p14:creationId xmlns:p14="http://schemas.microsoft.com/office/powerpoint/2010/main" val="1115311843"/>
+      </p:ext>
+    </p:extLst>
+  </p:cSld>
+  <p:clrMapOvr>
+    <a:masterClrMapping/>
+  </p:clrMapOvr>
+  <p:transition spd="med"/>
+</p:sld>
+</file>
+
+<file path=ppt/slides/slide13.xml><?xml version="1.0" encoding="utf-8"?>
+<p:sld xmlns:a="http://schemas.openxmlformats.org/drawingml/2006/main" xmlns:r="http://schemas.openxmlformats.org/officeDocument/2006/relationships" xmlns:p="http://schemas.openxmlformats.org/presentationml/2006/main">
+  <p:cSld>
+    <p:spTree>
+      <p:nvGrpSpPr>
+        <p:cNvPr id="1" name=""/>
+        <p:cNvGrpSpPr/>
+        <p:nvPr/>
+      </p:nvGrpSpPr>
+      <p:grpSpPr>
+        <a:xfrm>
+          <a:off x="0" y="0"/>
+          <a:ext cx="0" cy="0"/>
+          <a:chOff x="0" y="0"/>
+          <a:chExt cx="0" cy="0"/>
+        </a:xfrm>
+      </p:grpSpPr>
+      <p:pic>
+        <p:nvPicPr>
+          <p:cNvPr id="112" name="Picture 6" descr="Picture 6"/>
+          <p:cNvPicPr>
+            <a:picLocks noChangeAspect="1"/>
+          </p:cNvPicPr>
+          <p:nvPr/>
+        </p:nvPicPr>
+        <p:blipFill>
+          <a:blip r:embed="rId2"/>
+          <a:stretch>
+            <a:fillRect/>
+          </a:stretch>
+        </p:blipFill>
+        <p:spPr>
+          <a:xfrm>
+            <a:off x="0" y="0"/>
+            <a:ext cx="9144000" cy="5143500"/>
+          </a:xfrm>
+          <a:prstGeom prst="rect">
+            <a:avLst/>
+          </a:prstGeom>
+          <a:ln w="12700">
+            <a:miter lim="400000"/>
+            <a:headEnd/>
+            <a:tailEnd/>
+          </a:ln>
+        </p:spPr>
+      </p:pic>
+      <p:pic>
+        <p:nvPicPr>
+          <p:cNvPr id="114" name="Picture 5" descr="Picture 5"/>
+          <p:cNvPicPr>
+            <a:picLocks noChangeAspect="1"/>
+          </p:cNvPicPr>
+          <p:nvPr/>
+        </p:nvPicPr>
+        <p:blipFill>
+          <a:blip r:embed="rId3"/>
+          <a:stretch>
+            <a:fillRect/>
+          </a:stretch>
+        </p:blipFill>
+        <p:spPr>
+          <a:xfrm>
+            <a:off x="469900" y="0"/>
+            <a:ext cx="4391984" cy="171450"/>
+          </a:xfrm>
+          <a:prstGeom prst="rect">
+            <a:avLst/>
+          </a:prstGeom>
+          <a:ln w="12700">
+            <a:miter lim="400000"/>
+            <a:headEnd/>
+            <a:tailEnd/>
+          </a:ln>
+        </p:spPr>
+      </p:pic>
+      <p:sp>
+        <p:nvSpPr>
+          <p:cNvPr id="3" name="Título 2"/>
+          <p:cNvSpPr>
+            <a:spLocks noGrp="1"/>
+          </p:cNvSpPr>
+          <p:nvPr>
+            <p:ph type="title"/>
+          </p:nvPr>
+        </p:nvSpPr>
+        <p:spPr>
+          <a:xfrm>
+            <a:off x="285751" y="2386770"/>
+            <a:ext cx="8615364" cy="1102519"/>
+          </a:xfrm>
+        </p:spPr>
+        <p:txBody>
+          <a:bodyPr>
+            <a:noAutofit/>
+          </a:bodyPr>
+          <a:lstStyle/>
+          <a:p>
+            <a:r>
+              <a:rPr lang="pt-BR" sz="4800" b="1" dirty="0">
+                <a:solidFill>
+                  <a:schemeClr val="bg1"/>
+                </a:solidFill>
+              </a:rPr>
+              <a:t>Python Big Data</a:t>
+            </a:r>
+          </a:p>
+        </p:txBody>
+      </p:sp>
+      <p:sp>
+        <p:nvSpPr>
+          <p:cNvPr id="6" name="Título 2"/>
+          <p:cNvSpPr txBox="1"/>
+          <p:nvPr/>
+        </p:nvSpPr>
+        <p:spPr>
+          <a:xfrm>
+            <a:off x="975683" y="3866663"/>
+            <a:ext cx="7772400" cy="1102519"/>
+          </a:xfrm>
+          <a:prstGeom prst="rect">
+            <a:avLst/>
+          </a:prstGeom>
+          <a:ln w="12700">
+            <a:miter lim="400000"/>
+          </a:ln>
+        </p:spPr>
+        <p:txBody>
+          <a:bodyPr lIns="45718" tIns="45718" rIns="45718" bIns="45718" anchor="ctr">
+            <a:noAutofit/>
+          </a:bodyPr>
+          <a:lstStyle>
+            <a:lvl1pPr marL="0" marR="0" indent="0" algn="ctr" defTabSz="457200" rtl="0" latinLnBrk="0">
+              <a:lnSpc>
+                <a:spcPct val="100000"/>
+              </a:lnSpc>
+              <a:spcBef>
+                <a:spcPts val="0"/>
+              </a:spcBef>
+              <a:spcAft>
+                <a:spcPts val="0"/>
+              </a:spcAft>
+              <a:buClrTx/>
+              <a:buSzTx/>
+              <a:buFontTx/>
+              <a:buNone/>
+              <a:defRPr sz="4400" b="0" i="0" u="none" strike="noStrike" cap="none" spc="0" baseline="0">
+                <a:ln>
+                  <a:noFill/>
+                </a:ln>
+                <a:solidFill>
+                  <a:srgbClr val="000000"/>
+                </a:solidFill>
+                <a:uFillTx/>
+                <a:latin typeface="+mj-lt"/>
+                <a:ea typeface="+mj-ea"/>
+                <a:cs typeface="+mj-cs"/>
+                <a:sym typeface="Calibri"/>
+              </a:defRPr>
+            </a:lvl1pPr>
+            <a:lvl2pPr marL="0" marR="0" indent="0" algn="ctr" defTabSz="457200" rtl="0" latinLnBrk="0">
+              <a:lnSpc>
+                <a:spcPct val="100000"/>
+              </a:lnSpc>
+              <a:spcBef>
+                <a:spcPts val="0"/>
+              </a:spcBef>
+              <a:spcAft>
+                <a:spcPts val="0"/>
+              </a:spcAft>
+              <a:buClrTx/>
+              <a:buSzTx/>
+              <a:buFontTx/>
+              <a:buNone/>
+              <a:defRPr sz="4400" b="0" i="0" u="none" strike="noStrike" cap="none" spc="0" baseline="0">
+                <a:ln>
+                  <a:noFill/>
+                </a:ln>
+                <a:solidFill>
+                  <a:srgbClr val="000000"/>
+                </a:solidFill>
+                <a:uFillTx/>
+                <a:latin typeface="+mj-lt"/>
+                <a:ea typeface="+mj-ea"/>
+                <a:cs typeface="+mj-cs"/>
+                <a:sym typeface="Calibri"/>
+              </a:defRPr>
+            </a:lvl2pPr>
+            <a:lvl3pPr marL="0" marR="0" indent="0" algn="ctr" defTabSz="457200" rtl="0" latinLnBrk="0">
+              <a:lnSpc>
+                <a:spcPct val="100000"/>
+              </a:lnSpc>
+              <a:spcBef>
+                <a:spcPts val="0"/>
+              </a:spcBef>
+              <a:spcAft>
+                <a:spcPts val="0"/>
+              </a:spcAft>
+              <a:buClrTx/>
+              <a:buSzTx/>
+              <a:buFontTx/>
+              <a:buNone/>
+              <a:defRPr sz="4400" b="0" i="0" u="none" strike="noStrike" cap="none" spc="0" baseline="0">
+                <a:ln>
+                  <a:noFill/>
+                </a:ln>
+                <a:solidFill>
+                  <a:srgbClr val="000000"/>
+                </a:solidFill>
+                <a:uFillTx/>
+                <a:latin typeface="+mj-lt"/>
+                <a:ea typeface="+mj-ea"/>
+                <a:cs typeface="+mj-cs"/>
+                <a:sym typeface="Calibri"/>
+              </a:defRPr>
+            </a:lvl3pPr>
+            <a:lvl4pPr marL="0" marR="0" indent="0" algn="ctr" defTabSz="457200" rtl="0" latinLnBrk="0">
+              <a:lnSpc>
+                <a:spcPct val="100000"/>
+              </a:lnSpc>
+              <a:spcBef>
+                <a:spcPts val="0"/>
+              </a:spcBef>
+              <a:spcAft>
+                <a:spcPts val="0"/>
+              </a:spcAft>
+              <a:buClrTx/>
+              <a:buSzTx/>
+              <a:buFontTx/>
+              <a:buNone/>
+              <a:defRPr sz="4400" b="0" i="0" u="none" strike="noStrike" cap="none" spc="0" baseline="0">
+                <a:ln>
+                  <a:noFill/>
+                </a:ln>
+                <a:solidFill>
+                  <a:srgbClr val="000000"/>
+                </a:solidFill>
+                <a:uFillTx/>
+                <a:latin typeface="+mj-lt"/>
+                <a:ea typeface="+mj-ea"/>
+                <a:cs typeface="+mj-cs"/>
+                <a:sym typeface="Calibri"/>
+              </a:defRPr>
+            </a:lvl4pPr>
+            <a:lvl5pPr marL="0" marR="0" indent="0" algn="ctr" defTabSz="457200" rtl="0" latinLnBrk="0">
+              <a:lnSpc>
+                <a:spcPct val="100000"/>
+              </a:lnSpc>
+              <a:spcBef>
+                <a:spcPts val="0"/>
+              </a:spcBef>
+              <a:spcAft>
+                <a:spcPts val="0"/>
+              </a:spcAft>
+              <a:buClrTx/>
+              <a:buSzTx/>
+              <a:buFontTx/>
+              <a:buNone/>
+              <a:defRPr sz="4400" b="0" i="0" u="none" strike="noStrike" cap="none" spc="0" baseline="0">
+                <a:ln>
+                  <a:noFill/>
+                </a:ln>
+                <a:solidFill>
+                  <a:srgbClr val="000000"/>
+                </a:solidFill>
+                <a:uFillTx/>
+                <a:latin typeface="+mj-lt"/>
+                <a:ea typeface="+mj-ea"/>
+                <a:cs typeface="+mj-cs"/>
+                <a:sym typeface="Calibri"/>
+              </a:defRPr>
+            </a:lvl5pPr>
+            <a:lvl6pPr marL="0" marR="0" indent="0" algn="ctr" defTabSz="457200" rtl="0" latinLnBrk="0">
+              <a:lnSpc>
+                <a:spcPct val="100000"/>
+              </a:lnSpc>
+              <a:spcBef>
+                <a:spcPts val="0"/>
+              </a:spcBef>
+              <a:spcAft>
+                <a:spcPts val="0"/>
+              </a:spcAft>
+              <a:buClrTx/>
+              <a:buSzTx/>
+              <a:buFontTx/>
+              <a:buNone/>
+              <a:defRPr sz="4400" b="0" i="0" u="none" strike="noStrike" cap="none" spc="0" baseline="0">
+                <a:ln>
+                  <a:noFill/>
+                </a:ln>
+                <a:solidFill>
+                  <a:srgbClr val="000000"/>
+                </a:solidFill>
+                <a:uFillTx/>
+                <a:latin typeface="+mj-lt"/>
+                <a:ea typeface="+mj-ea"/>
+                <a:cs typeface="+mj-cs"/>
+                <a:sym typeface="Calibri"/>
+              </a:defRPr>
+            </a:lvl6pPr>
+            <a:lvl7pPr marL="0" marR="0" indent="0" algn="ctr" defTabSz="457200" rtl="0" latinLnBrk="0">
+              <a:lnSpc>
+                <a:spcPct val="100000"/>
+              </a:lnSpc>
+              <a:spcBef>
+                <a:spcPts val="0"/>
+              </a:spcBef>
+              <a:spcAft>
+                <a:spcPts val="0"/>
+              </a:spcAft>
+              <a:buClrTx/>
+              <a:buSzTx/>
+              <a:buFontTx/>
+              <a:buNone/>
+              <a:defRPr sz="4400" b="0" i="0" u="none" strike="noStrike" cap="none" spc="0" baseline="0">
+                <a:ln>
+                  <a:noFill/>
+                </a:ln>
+                <a:solidFill>
+                  <a:srgbClr val="000000"/>
+                </a:solidFill>
+                <a:uFillTx/>
+                <a:latin typeface="+mj-lt"/>
+                <a:ea typeface="+mj-ea"/>
+                <a:cs typeface="+mj-cs"/>
+                <a:sym typeface="Calibri"/>
+              </a:defRPr>
+            </a:lvl7pPr>
+            <a:lvl8pPr marL="0" marR="0" indent="0" algn="ctr" defTabSz="457200" rtl="0" latinLnBrk="0">
+              <a:lnSpc>
+                <a:spcPct val="100000"/>
+              </a:lnSpc>
+              <a:spcBef>
+                <a:spcPts val="0"/>
+              </a:spcBef>
+              <a:spcAft>
+                <a:spcPts val="0"/>
+              </a:spcAft>
+              <a:buClrTx/>
+              <a:buSzTx/>
+              <a:buFontTx/>
+              <a:buNone/>
+              <a:defRPr sz="4400" b="0" i="0" u="none" strike="noStrike" cap="none" spc="0" baseline="0">
+                <a:ln>
+                  <a:noFill/>
+                </a:ln>
+                <a:solidFill>
+                  <a:srgbClr val="000000"/>
+                </a:solidFill>
+                <a:uFillTx/>
+                <a:latin typeface="+mj-lt"/>
+                <a:ea typeface="+mj-ea"/>
+                <a:cs typeface="+mj-cs"/>
+                <a:sym typeface="Calibri"/>
+              </a:defRPr>
+            </a:lvl8pPr>
+            <a:lvl9pPr marL="0" marR="0" indent="0" algn="ctr" defTabSz="457200" rtl="0" latinLnBrk="0">
+              <a:lnSpc>
+                <a:spcPct val="100000"/>
+              </a:lnSpc>
+              <a:spcBef>
+                <a:spcPts val="0"/>
+              </a:spcBef>
+              <a:spcAft>
+                <a:spcPts val="0"/>
+              </a:spcAft>
+              <a:buClrTx/>
+              <a:buSzTx/>
+              <a:buFontTx/>
+              <a:buNone/>
+              <a:defRPr sz="4400" b="0" i="0" u="none" strike="noStrike" cap="none" spc="0" baseline="0">
+                <a:ln>
+                  <a:noFill/>
+                </a:ln>
+                <a:solidFill>
+                  <a:srgbClr val="000000"/>
+                </a:solidFill>
+                <a:uFillTx/>
+                <a:latin typeface="+mj-lt"/>
+                <a:ea typeface="+mj-ea"/>
+                <a:cs typeface="+mj-cs"/>
+                <a:sym typeface="Calibri"/>
+              </a:defRPr>
+            </a:lvl9pPr>
+          </a:lstStyle>
+          <a:p>
+            <a:pPr algn="r" hangingPunct="1"/>
+            <a:r>
+              <a:rPr lang="pt-BR" sz="2000" b="1" dirty="0">
+                <a:solidFill>
+                  <a:schemeClr val="bg1"/>
+                </a:solidFill>
+              </a:rPr>
+              <a:t>Professor </a:t>
+            </a:r>
+            <a:r>
+              <a:rPr lang="pt-BR" sz="2000" b="1">
+                <a:solidFill>
+                  <a:schemeClr val="bg1"/>
+                </a:solidFill>
+              </a:rPr>
+              <a:t>M.Sc</a:t>
+            </a:r>
+            <a:r>
+              <a:rPr lang="pt-BR" sz="2000" b="1" dirty="0">
+                <a:solidFill>
+                  <a:schemeClr val="bg1"/>
+                </a:solidFill>
+              </a:rPr>
+              <a:t>. Heleno Cardoso</a:t>
+            </a:r>
+          </a:p>
+        </p:txBody>
+      </p:sp>
+      <p:pic>
+        <p:nvPicPr>
+          <p:cNvPr id="2" name="Google Shape;62;p1" descr="Imagem">
+            <a:extLst>
+              <a:ext uri="{FF2B5EF4-FFF2-40B4-BE49-F238E27FC236}">
+                <a16:creationId xmlns:a16="http://schemas.microsoft.com/office/drawing/2014/main" id="{9C895622-2963-024D-634E-EA58F5381D06}"/>
+              </a:ext>
+            </a:extLst>
+          </p:cNvPr>
+          <p:cNvPicPr preferRelativeResize="0"/>
+          <p:nvPr/>
+        </p:nvPicPr>
+        <p:blipFill rotWithShape="1">
+          <a:blip r:embed="rId4">
+            <a:alphaModFix/>
+          </a:blip>
+          <a:srcRect/>
+          <a:stretch/>
+        </p:blipFill>
+        <p:spPr>
+          <a:xfrm>
+            <a:off x="469898" y="343798"/>
+            <a:ext cx="2858518" cy="1338697"/>
+          </a:xfrm>
+          <a:prstGeom prst="rect">
+            <a:avLst/>
+          </a:prstGeom>
+          <a:noFill/>
+          <a:ln>
+            <a:noFill/>
+          </a:ln>
+        </p:spPr>
+      </p:pic>
+    </p:spTree>
+  </p:cSld>
+  <p:clrMapOvr>
+    <a:masterClrMapping/>
+  </p:clrMapOvr>
+  <p:transition spd="med"/>
+</p:sld>
+</file>
+
 <file path=ppt/slides/slide2.xml><?xml version="1.0" encoding="utf-8"?>
 <p:sld xmlns:a="http://schemas.openxmlformats.org/drawingml/2006/main" xmlns:r="http://schemas.openxmlformats.org/officeDocument/2006/relationships" xmlns:p="http://schemas.openxmlformats.org/presentationml/2006/main">
   <p:cSld>
@@ -3940,7 +5264,7 @@
                   <a:schemeClr val="bg1"/>
                 </a:solidFill>
               </a:rPr>
-              <a:t>Aula 01</a:t>
+              <a:t>Aula 02</a:t>
             </a:r>
             <a:br>
               <a:rPr lang="pt-BR" b="1" dirty="0">
@@ -3963,7 +5287,22 @@
                   <a:schemeClr val="bg1"/>
                 </a:solidFill>
               </a:rPr>
-              <a:t>Contextualização</a:t>
+              <a:t>Armazenamento e Gestão de Dados</a:t>
+            </a:r>
+            <a:br>
+              <a:rPr lang="pt-BR" sz="3600" b="1" dirty="0">
+                <a:solidFill>
+                  <a:schemeClr val="bg1"/>
+                </a:solidFill>
+              </a:rPr>
+            </a:br>
+            <a:r>
+              <a:rPr lang="pt-BR" sz="3600" b="1" dirty="0">
+                <a:solidFill>
+                  <a:schemeClr val="bg1"/>
+                </a:solidFill>
+              </a:rPr>
+              <a:t>    Bibliotecas Python Data Science</a:t>
             </a:r>
           </a:p>
         </p:txBody>
@@ -4350,7 +5689,7 @@
         </p:spPr>
         <p:txBody>
           <a:bodyPr>
-            <a:normAutofit/>
+            <a:normAutofit fontScale="90000"/>
           </a:bodyPr>
           <a:lstStyle/>
           <a:p>
@@ -4360,13 +5699,32 @@
                   <a:srgbClr val="0070C0"/>
                 </a:solidFill>
               </a:rPr>
-              <a:t>Contextualização</a:t>
-            </a:r>
-            <a:endParaRPr lang="en-US" b="1" dirty="0">
-              <a:solidFill>
-                <a:srgbClr val="0070C0"/>
-              </a:solidFill>
-            </a:endParaRPr>
+              <a:t>Armazenamento</a:t>
+            </a:r>
+            <a:r>
+              <a:rPr lang="en-US" b="1" dirty="0">
+                <a:solidFill>
+                  <a:srgbClr val="0070C0"/>
+                </a:solidFill>
+              </a:rPr>
+              <a:t> e </a:t>
+            </a:r>
+            <a:r>
+              <a:rPr lang="en-US" b="1" dirty="0" err="1">
+                <a:solidFill>
+                  <a:srgbClr val="0070C0"/>
+                </a:solidFill>
+              </a:rPr>
+              <a:t>Gestão</a:t>
+            </a:r>
+            <a:r>
+              <a:rPr lang="en-US" b="1" dirty="0">
+                <a:solidFill>
+                  <a:srgbClr val="0070C0"/>
+                </a:solidFill>
+              </a:rPr>
+              <a:t> de Dados</a:t>
+            </a:r>
           </a:p>
         </p:txBody>
       </p:sp>
@@ -4397,20 +5755,109 @@
             </a:pPr>
             <a:r>
               <a:rPr lang="pt-BR" sz="2000" dirty="0">
+                <a:solidFill>
+                  <a:schemeClr val="tx1"/>
+                </a:solidFill>
                 <a:latin typeface="Times New Roman" panose="02020603050405020304" pitchFamily="18" charset="0"/>
                 <a:cs typeface="Times New Roman" panose="02020603050405020304" pitchFamily="18" charset="0"/>
               </a:rPr>
-              <a:t>Big Data</a:t>
-            </a:r>
-            <a:r>
-              <a:rPr lang="pt-BR" sz="2000" dirty="0">
+              <a:t>O gerenciamento de </a:t>
+            </a:r>
+            <a:r>
+              <a:rPr lang="pt-BR" sz="2000" b="1" dirty="0">
                 <a:solidFill>
                   <a:schemeClr val="tx1"/>
                 </a:solidFill>
                 <a:latin typeface="Times New Roman" panose="02020603050405020304" pitchFamily="18" charset="0"/>
                 <a:cs typeface="Times New Roman" panose="02020603050405020304" pitchFamily="18" charset="0"/>
               </a:rPr>
-              <a:t>...</a:t>
+              <a:t>Big Data </a:t>
+            </a:r>
+            <a:r>
+              <a:rPr lang="pt-BR" sz="2000" dirty="0">
+                <a:solidFill>
+                  <a:schemeClr val="tx1"/>
+                </a:solidFill>
+                <a:latin typeface="Times New Roman" panose="02020603050405020304" pitchFamily="18" charset="0"/>
+                <a:cs typeface="Times New Roman" panose="02020603050405020304" pitchFamily="18" charset="0"/>
+              </a:rPr>
+              <a:t>depende de sistemas com o poder de processar e analisar significativamente grandes volumes de dados diferentes e complexos.</a:t>
+            </a:r>
+          </a:p>
+          <a:p>
+            <a:pPr marL="0" indent="0" algn="just">
+              <a:buNone/>
+            </a:pPr>
+            <a:endParaRPr lang="pt-BR" sz="2000" dirty="0">
+              <a:solidFill>
+                <a:schemeClr val="tx1"/>
+              </a:solidFill>
+              <a:latin typeface="Times New Roman" panose="02020603050405020304" pitchFamily="18" charset="0"/>
+              <a:cs typeface="Times New Roman" panose="02020603050405020304" pitchFamily="18" charset="0"/>
+            </a:endParaRPr>
+          </a:p>
+          <a:p>
+            <a:pPr algn="just">
+              <a:buFont typeface="Wingdings" panose="05000000000000000000" pitchFamily="2" charset="2"/>
+              <a:buChar char="§"/>
+            </a:pPr>
+            <a:r>
+              <a:rPr lang="pt-BR" sz="2000" dirty="0">
+                <a:solidFill>
+                  <a:schemeClr val="tx1"/>
+                </a:solidFill>
+                <a:latin typeface="Times New Roman" panose="02020603050405020304" pitchFamily="18" charset="0"/>
+                <a:cs typeface="Times New Roman" panose="02020603050405020304" pitchFamily="18" charset="0"/>
+              </a:rPr>
+              <a:t>Disco rígido (HDD) O disco rígido é uma opção tradicional e amplamente utilizada para big data.</a:t>
+            </a:r>
+          </a:p>
+          <a:p>
+            <a:pPr algn="just">
+              <a:buFont typeface="Wingdings" panose="05000000000000000000" pitchFamily="2" charset="2"/>
+              <a:buChar char="§"/>
+            </a:pPr>
+            <a:r>
+              <a:rPr lang="pt-BR" sz="2000" dirty="0">
+                <a:solidFill>
+                  <a:schemeClr val="tx1"/>
+                </a:solidFill>
+                <a:latin typeface="Times New Roman" panose="02020603050405020304" pitchFamily="18" charset="0"/>
+                <a:cs typeface="Times New Roman" panose="02020603050405020304" pitchFamily="18" charset="0"/>
+              </a:rPr>
+              <a:t>Disco de estado sólido (SSD)</a:t>
+            </a:r>
+          </a:p>
+          <a:p>
+            <a:pPr algn="just">
+              <a:buFont typeface="Wingdings" panose="05000000000000000000" pitchFamily="2" charset="2"/>
+              <a:buChar char="§"/>
+            </a:pPr>
+            <a:r>
+              <a:rPr lang="pt-BR" sz="2000" dirty="0">
+                <a:solidFill>
+                  <a:schemeClr val="tx1"/>
+                </a:solidFill>
+                <a:latin typeface="Times New Roman" panose="02020603050405020304" pitchFamily="18" charset="0"/>
+                <a:cs typeface="Times New Roman" panose="02020603050405020304" pitchFamily="18" charset="0"/>
+              </a:rPr>
+              <a:t>Nuvem</a:t>
+            </a:r>
+          </a:p>
+          <a:p>
+            <a:pPr algn="just">
+              <a:buFont typeface="Wingdings" panose="05000000000000000000" pitchFamily="2" charset="2"/>
+              <a:buChar char="§"/>
+            </a:pPr>
+            <a:r>
+              <a:rPr lang="pt-BR" sz="2000" dirty="0">
+                <a:solidFill>
+                  <a:schemeClr val="tx1"/>
+                </a:solidFill>
+                <a:latin typeface="Times New Roman" panose="02020603050405020304" pitchFamily="18" charset="0"/>
+                <a:cs typeface="Times New Roman" panose="02020603050405020304" pitchFamily="18" charset="0"/>
+              </a:rPr>
+              <a:t>Armazenamento definido por software (SDS), camada</a:t>
             </a:r>
           </a:p>
         </p:txBody>
@@ -4464,7 +5911,7 @@
         </p:spPr>
         <p:txBody>
           <a:bodyPr>
-            <a:normAutofit/>
+            <a:normAutofit fontScale="90000"/>
           </a:bodyPr>
           <a:lstStyle/>
           <a:p>
@@ -4474,7 +5921,7 @@
                   <a:srgbClr val="0070C0"/>
                 </a:solidFill>
               </a:rPr>
-              <a:t>Leitura</a:t>
+              <a:t>Armazenamento</a:t>
             </a:r>
             <a:r>
               <a:rPr lang="en-US" b="1" dirty="0">
@@ -4482,7 +5929,7 @@
                   <a:srgbClr val="0070C0"/>
                 </a:solidFill>
               </a:rPr>
-              <a:t> </a:t>
+              <a:t> e </a:t>
             </a:r>
             <a:r>
               <a:rPr lang="en-US" b="1" dirty="0" err="1">
@@ -4490,13 +5937,16 @@
                   <a:srgbClr val="0070C0"/>
                 </a:solidFill>
               </a:rPr>
-              <a:t>Específica</a:t>
-            </a:r>
-            <a:endParaRPr lang="en-US" b="1" dirty="0">
-              <a:solidFill>
-                <a:srgbClr val="0070C0"/>
-              </a:solidFill>
-            </a:endParaRPr>
+              <a:t>Gestão</a:t>
+            </a:r>
+            <a:r>
+              <a:rPr lang="en-US" b="1" dirty="0">
+                <a:solidFill>
+                  <a:srgbClr val="0070C0"/>
+                </a:solidFill>
+              </a:rPr>
+              <a:t> de Dados</a:t>
+            </a:r>
           </a:p>
         </p:txBody>
       </p:sp>
@@ -4513,7 +5963,7 @@
         <p:spPr>
           <a:xfrm>
             <a:off x="142865" y="1200150"/>
-            <a:ext cx="8865056" cy="3737369"/>
+            <a:ext cx="8865056" cy="3737370"/>
           </a:xfrm>
         </p:spPr>
         <p:txBody>
@@ -4526,26 +5976,24 @@
               <a:buNone/>
             </a:pPr>
             <a:r>
-              <a:rPr lang="pt-BR" sz="2000" dirty="0">
+              <a:rPr lang="pt-BR" sz="2000" b="1" dirty="0">
+                <a:solidFill>
+                  <a:schemeClr val="tx1"/>
+                </a:solidFill>
                 <a:latin typeface="Times New Roman" panose="02020603050405020304" pitchFamily="18" charset="0"/>
                 <a:cs typeface="Times New Roman" panose="02020603050405020304" pitchFamily="18" charset="0"/>
               </a:rPr>
-              <a:t>[1] Python Big Data – Parte 1.</a:t>
-            </a:r>
-          </a:p>
-          <a:p>
-            <a:pPr marL="0" indent="0" algn="just">
-              <a:buNone/>
-            </a:pPr>
-            <a:r>
-              <a:rPr lang="pt-BR" sz="2000" b="1" dirty="0">
-                <a:solidFill>
-                  <a:srgbClr val="FF0000"/>
+              <a:t>Armazenamento de dados </a:t>
+            </a:r>
+            <a:r>
+              <a:rPr lang="pt-BR" sz="2000" dirty="0">
+                <a:solidFill>
+                  <a:schemeClr val="tx1"/>
                 </a:solidFill>
                 <a:latin typeface="Times New Roman" panose="02020603050405020304" pitchFamily="18" charset="0"/>
                 <a:cs typeface="Times New Roman" panose="02020603050405020304" pitchFamily="18" charset="0"/>
               </a:rPr>
-              <a:t>Disponível em:</a:t>
+              <a:t>é o termo que define como registrar, manter, disponibilizar e proteger informações digitais de sistemas computacionais e outros dispositivos. </a:t>
             </a:r>
           </a:p>
           <a:p>
@@ -4553,6 +6001,9 @@
               <a:buNone/>
             </a:pPr>
             <a:endParaRPr lang="pt-BR" sz="2000" dirty="0">
+              <a:solidFill>
+                <a:schemeClr val="tx1"/>
+              </a:solidFill>
               <a:latin typeface="Times New Roman" panose="02020603050405020304" pitchFamily="18" charset="0"/>
               <a:cs typeface="Times New Roman" panose="02020603050405020304" pitchFamily="18" charset="0"/>
             </a:endParaRPr>
@@ -4563,36 +6014,21 @@
             </a:pPr>
             <a:r>
               <a:rPr lang="pt-BR" sz="2000" dirty="0">
+                <a:solidFill>
+                  <a:schemeClr val="tx1"/>
+                </a:solidFill>
                 <a:latin typeface="Times New Roman" panose="02020603050405020304" pitchFamily="18" charset="0"/>
                 <a:cs typeface="Times New Roman" panose="02020603050405020304" pitchFamily="18" charset="0"/>
               </a:rPr>
-              <a:t>[2] Python Big Data – Parte 2. </a:t>
-            </a:r>
-          </a:p>
-          <a:p>
-            <a:pPr marL="0" indent="0" algn="just">
-              <a:buNone/>
-            </a:pPr>
-            <a:r>
-              <a:rPr lang="pt-BR" sz="2000" b="1" dirty="0">
-                <a:solidFill>
-                  <a:srgbClr val="FF0000"/>
-                </a:solidFill>
-                <a:latin typeface="Times New Roman" panose="02020603050405020304" pitchFamily="18" charset="0"/>
-                <a:cs typeface="Times New Roman" panose="02020603050405020304" pitchFamily="18" charset="0"/>
-              </a:rPr>
-              <a:t>Disponível em:</a:t>
-            </a:r>
-            <a:endParaRPr lang="pt-BR" sz="2000" dirty="0">
-              <a:latin typeface="Calibri" panose="020F0502020204030204" pitchFamily="34" charset="0"/>
-            </a:endParaRPr>
+              <a:t>	Essa atividade envolve o uso de equipamentos como memórias, hard disks, unidades ópticas, fitas magnéticas e serviços de nuvem.</a:t>
+            </a:r>
           </a:p>
         </p:txBody>
       </p:sp>
     </p:spTree>
     <p:extLst>
       <p:ext uri="{BB962C8B-B14F-4D97-AF65-F5344CB8AC3E}">
-        <p14:creationId xmlns:p14="http://schemas.microsoft.com/office/powerpoint/2010/main" val="3680270425"/>
+        <p14:creationId xmlns:p14="http://schemas.microsoft.com/office/powerpoint/2010/main" val="529802730"/>
       </p:ext>
     </p:extLst>
   </p:cSld>
@@ -4638,7 +6074,7 @@
         </p:spPr>
         <p:txBody>
           <a:bodyPr>
-            <a:normAutofit/>
+            <a:normAutofit fontScale="90000"/>
           </a:bodyPr>
           <a:lstStyle/>
           <a:p>
@@ -4648,7 +6084,7 @@
                   <a:srgbClr val="0070C0"/>
                 </a:solidFill>
               </a:rPr>
-              <a:t>Aprenda</a:t>
+              <a:t>Armazenamento</a:t>
             </a:r>
             <a:r>
               <a:rPr lang="en-US" b="1" dirty="0">
@@ -4656,7 +6092,23 @@
                   <a:srgbClr val="0070C0"/>
                 </a:solidFill>
               </a:rPr>
-              <a:t>+</a:t>
+              <a:t> e </a:t>
+            </a:r>
+            <a:r>
+              <a:rPr lang="en-US" b="1" dirty="0" err="1">
+                <a:solidFill>
+                  <a:srgbClr val="0070C0"/>
+                </a:solidFill>
+              </a:rPr>
+              <a:t>Gestão</a:t>
+            </a:r>
+            <a:r>
+              <a:rPr lang="en-US" b="1" dirty="0">
+                <a:solidFill>
+                  <a:srgbClr val="0070C0"/>
+                </a:solidFill>
+              </a:rPr>
+              <a:t> de Dados</a:t>
             </a:r>
           </a:p>
         </p:txBody>
@@ -4687,36 +6139,24 @@
               <a:buNone/>
             </a:pPr>
             <a:r>
-              <a:rPr lang="pt-BR" sz="2400" dirty="0">
+              <a:rPr lang="pt-BR" sz="2000" b="1" dirty="0">
+                <a:solidFill>
+                  <a:srgbClr val="FF0000"/>
+                </a:solidFill>
                 <a:latin typeface="Times New Roman" panose="02020603050405020304" pitchFamily="18" charset="0"/>
                 <a:cs typeface="Times New Roman" panose="02020603050405020304" pitchFamily="18" charset="0"/>
               </a:rPr>
-              <a:t>[1] Python Big Data – Parte 1</a:t>
+              <a:t>Tipos de Dados</a:t>
             </a:r>
           </a:p>
           <a:p>
             <a:pPr marL="0" indent="0" algn="just">
               <a:buNone/>
             </a:pPr>
-            <a:r>
-              <a:rPr lang="pt-BR" sz="2400" b="1" dirty="0">
-                <a:solidFill>
-                  <a:srgbClr val="FF0000"/>
-                </a:solidFill>
-                <a:latin typeface="Times New Roman" panose="02020603050405020304" pitchFamily="18" charset="0"/>
-                <a:cs typeface="Times New Roman" panose="02020603050405020304" pitchFamily="18" charset="0"/>
-              </a:rPr>
-              <a:t>Disponível em: </a:t>
-            </a:r>
-            <a:r>
-              <a:rPr lang="pt-BR" sz="2400" dirty="0">
-                <a:latin typeface="Times New Roman" panose="02020603050405020304" pitchFamily="18" charset="0"/>
-                <a:cs typeface="Times New Roman" panose="02020603050405020304" pitchFamily="18" charset="0"/>
-                <a:hlinkClick r:id="rId3"/>
-              </a:rPr>
-              <a:t>https://</a:t>
-            </a:r>
-            <a:endParaRPr lang="pt-BR" sz="2400" dirty="0">
+            <a:endParaRPr lang="pt-BR" sz="2000" dirty="0">
+              <a:solidFill>
+                <a:schemeClr val="tx1"/>
+              </a:solidFill>
               <a:latin typeface="Times New Roman" panose="02020603050405020304" pitchFamily="18" charset="0"/>
               <a:cs typeface="Times New Roman" panose="02020603050405020304" pitchFamily="18" charset="0"/>
             </a:endParaRPr>
@@ -4725,7 +6165,10 @@
             <a:pPr marL="0" indent="0" algn="just">
               <a:buNone/>
             </a:pPr>
-            <a:endParaRPr lang="pt-BR" sz="2400" dirty="0">
+            <a:endParaRPr lang="pt-BR" sz="2000" dirty="0">
+              <a:solidFill>
+                <a:schemeClr val="tx1"/>
+              </a:solidFill>
               <a:latin typeface="Times New Roman" panose="02020603050405020304" pitchFamily="18" charset="0"/>
               <a:cs typeface="Times New Roman" panose="02020603050405020304" pitchFamily="18" charset="0"/>
             </a:endParaRPr>
@@ -4734,37 +6177,10 @@
             <a:pPr marL="0" indent="0" algn="just">
               <a:buNone/>
             </a:pPr>
-            <a:r>
-              <a:rPr lang="pt-BR" sz="2400" dirty="0">
-                <a:latin typeface="Times New Roman" panose="02020603050405020304" pitchFamily="18" charset="0"/>
-                <a:cs typeface="Times New Roman" panose="02020603050405020304" pitchFamily="18" charset="0"/>
-              </a:rPr>
-              <a:t>[2] Python Big Data – Parte 2</a:t>
-            </a:r>
-          </a:p>
-          <a:p>
-            <a:pPr marL="0" indent="0" algn="just">
-              <a:buNone/>
-            </a:pPr>
-            <a:r>
-              <a:rPr lang="pt-BR" sz="2400" b="1" dirty="0">
-                <a:solidFill>
-                  <a:srgbClr val="FF0000"/>
-                </a:solidFill>
-                <a:latin typeface="Times New Roman" panose="02020603050405020304" pitchFamily="18" charset="0"/>
-                <a:cs typeface="Times New Roman" panose="02020603050405020304" pitchFamily="18" charset="0"/>
-              </a:rPr>
-              <a:t>Disponível em: </a:t>
-            </a:r>
-            <a:r>
-              <a:rPr lang="pt-BR" sz="2400" dirty="0">
-                <a:latin typeface="Times New Roman" panose="02020603050405020304" pitchFamily="18" charset="0"/>
-                <a:cs typeface="Times New Roman" panose="02020603050405020304" pitchFamily="18" charset="0"/>
-                <a:hlinkClick r:id="rId4"/>
-              </a:rPr>
-              <a:t>https://</a:t>
-            </a:r>
-            <a:endParaRPr lang="pt-BR" sz="2400" dirty="0">
+            <a:endParaRPr lang="pt-BR" sz="2000" dirty="0">
+              <a:solidFill>
+                <a:schemeClr val="tx1"/>
+              </a:solidFill>
               <a:latin typeface="Times New Roman" panose="02020603050405020304" pitchFamily="18" charset="0"/>
               <a:cs typeface="Times New Roman" panose="02020603050405020304" pitchFamily="18" charset="0"/>
             </a:endParaRPr>
@@ -4773,17 +6189,71 @@
             <a:pPr marL="0" indent="0" algn="just">
               <a:buNone/>
             </a:pPr>
-            <a:endParaRPr lang="pt-BR" sz="2400" dirty="0">
+            <a:endParaRPr lang="pt-BR" sz="2000" dirty="0">
+              <a:solidFill>
+                <a:schemeClr val="tx1"/>
+              </a:solidFill>
               <a:latin typeface="Times New Roman" panose="02020603050405020304" pitchFamily="18" charset="0"/>
               <a:cs typeface="Times New Roman" panose="02020603050405020304" pitchFamily="18" charset="0"/>
             </a:endParaRPr>
           </a:p>
+          <a:p>
+            <a:pPr marL="0" indent="0" algn="just">
+              <a:buNone/>
+            </a:pPr>
+            <a:endParaRPr lang="pt-BR" sz="2000" dirty="0">
+              <a:solidFill>
+                <a:schemeClr val="tx1"/>
+              </a:solidFill>
+              <a:latin typeface="Times New Roman" panose="02020603050405020304" pitchFamily="18" charset="0"/>
+              <a:cs typeface="Times New Roman" panose="02020603050405020304" pitchFamily="18" charset="0"/>
+            </a:endParaRPr>
+          </a:p>
         </p:txBody>
       </p:sp>
+      <p:pic>
+        <p:nvPicPr>
+          <p:cNvPr id="3" name="Gráfico 2">
+            <a:extLst>
+              <a:ext uri="{FF2B5EF4-FFF2-40B4-BE49-F238E27FC236}">
+                <a16:creationId xmlns:a16="http://schemas.microsoft.com/office/drawing/2014/main" id="{97414CE3-BBF8-6700-0EAD-EA3326A305E4}"/>
+              </a:ext>
+            </a:extLst>
+          </p:cNvPr>
+          <p:cNvPicPr>
+            <a:picLocks noChangeAspect="1"/>
+          </p:cNvPicPr>
+          <p:nvPr/>
+        </p:nvPicPr>
+        <p:blipFill>
+          <a:blip r:embed="rId3">
+            <a:extLst>
+              <a:ext uri="{28A0092B-C50C-407E-A947-70E740481C1C}">
+                <a14:useLocalDpi xmlns:a14="http://schemas.microsoft.com/office/drawing/2010/main" val="0"/>
+              </a:ext>
+              <a:ext uri="{96DAC541-7B7A-43D3-8B79-37D633B846F1}">
+                <asvg:svgBlip xmlns:asvg="http://schemas.microsoft.com/office/drawing/2016/SVG/main" r:embed="rId4"/>
+              </a:ext>
+            </a:extLst>
+          </a:blip>
+          <a:stretch>
+            <a:fillRect/>
+          </a:stretch>
+        </p:blipFill>
+        <p:spPr>
+          <a:xfrm>
+            <a:off x="136079" y="2239756"/>
+            <a:ext cx="8686800" cy="1279996"/>
+          </a:xfrm>
+          <a:prstGeom prst="rect">
+            <a:avLst/>
+          </a:prstGeom>
+        </p:spPr>
+      </p:pic>
     </p:spTree>
     <p:extLst>
       <p:ext uri="{BB962C8B-B14F-4D97-AF65-F5344CB8AC3E}">
-        <p14:creationId xmlns:p14="http://schemas.microsoft.com/office/powerpoint/2010/main" val="2747596967"/>
+        <p14:creationId xmlns:p14="http://schemas.microsoft.com/office/powerpoint/2010/main" val="2835884724"/>
       </p:ext>
     </p:extLst>
   </p:cSld>
@@ -4829,7 +6299,7 @@
         </p:spPr>
         <p:txBody>
           <a:bodyPr>
-            <a:normAutofit/>
+            <a:normAutofit fontScale="90000"/>
           </a:bodyPr>
           <a:lstStyle/>
           <a:p>
@@ -4839,7 +6309,7 @@
                   <a:srgbClr val="0070C0"/>
                 </a:solidFill>
               </a:rPr>
-              <a:t>Dinâmica</a:t>
+              <a:t>Armazenamento</a:t>
             </a:r>
             <a:r>
               <a:rPr lang="en-US" b="1" dirty="0">
@@ -4847,7 +6317,7 @@
                   <a:srgbClr val="0070C0"/>
                 </a:solidFill>
               </a:rPr>
-              <a:t>/</a:t>
+              <a:t> e </a:t>
             </a:r>
             <a:r>
               <a:rPr lang="en-US" b="1" dirty="0" err="1">
@@ -4855,13 +6325,16 @@
                   <a:srgbClr val="0070C0"/>
                 </a:solidFill>
               </a:rPr>
-              <a:t>Atividades</a:t>
-            </a:r>
-            <a:endParaRPr lang="en-US" b="1" dirty="0">
-              <a:solidFill>
-                <a:srgbClr val="0070C0"/>
-              </a:solidFill>
-            </a:endParaRPr>
+              <a:t>Gestão</a:t>
+            </a:r>
+            <a:r>
+              <a:rPr lang="en-US" b="1" dirty="0">
+                <a:solidFill>
+                  <a:srgbClr val="0070C0"/>
+                </a:solidFill>
+              </a:rPr>
+              <a:t> de Dados</a:t>
+            </a:r>
           </a:p>
         </p:txBody>
       </p:sp>
@@ -4877,8 +6350,8 @@
         </p:nvSpPr>
         <p:spPr>
           <a:xfrm>
-            <a:off x="139472" y="1063230"/>
-            <a:ext cx="8865056" cy="3606305"/>
+            <a:off x="142865" y="1200150"/>
+            <a:ext cx="8865056" cy="3737370"/>
           </a:xfrm>
         </p:spPr>
         <p:txBody>
@@ -4887,58 +6360,171 @@
           </a:bodyPr>
           <a:lstStyle/>
           <a:p>
-            <a:pPr algn="just">
-              <a:buFont typeface="Wingdings" panose="05000000000000000000" pitchFamily="2" charset="2"/>
-              <a:buChar char="§"/>
+            <a:pPr marL="0" indent="0" algn="just">
+              <a:buNone/>
             </a:pPr>
-            <a:r>
-              <a:rPr lang="pt-BR" dirty="0">
+            <a:endParaRPr lang="pt-BR" sz="2000" dirty="0">
+              <a:solidFill>
+                <a:schemeClr val="tx1"/>
+              </a:solidFill>
+              <a:latin typeface="Times New Roman" panose="02020603050405020304" pitchFamily="18" charset="0"/>
+              <a:cs typeface="Times New Roman" panose="02020603050405020304" pitchFamily="18" charset="0"/>
+            </a:endParaRPr>
+          </a:p>
+          <a:p>
+            <a:pPr marL="0" indent="0" algn="just">
+              <a:buNone/>
+            </a:pPr>
+            <a:endParaRPr lang="pt-BR" sz="2000" dirty="0">
+              <a:solidFill>
+                <a:schemeClr val="tx1"/>
+              </a:solidFill>
+              <a:latin typeface="Times New Roman" panose="02020603050405020304" pitchFamily="18" charset="0"/>
+              <a:cs typeface="Times New Roman" panose="02020603050405020304" pitchFamily="18" charset="0"/>
+            </a:endParaRPr>
+          </a:p>
+          <a:p>
+            <a:pPr marL="0" indent="0" algn="just">
+              <a:buNone/>
+            </a:pPr>
+            <a:endParaRPr lang="pt-BR" sz="2000" dirty="0">
+              <a:solidFill>
+                <a:schemeClr val="tx1"/>
+              </a:solidFill>
+              <a:latin typeface="Times New Roman" panose="02020603050405020304" pitchFamily="18" charset="0"/>
+              <a:cs typeface="Times New Roman" panose="02020603050405020304" pitchFamily="18" charset="0"/>
+            </a:endParaRPr>
+          </a:p>
+          <a:p>
+            <a:pPr marL="0" indent="0" algn="just">
+              <a:buNone/>
+            </a:pPr>
+            <a:endParaRPr lang="pt-BR" sz="2000" dirty="0">
+              <a:solidFill>
+                <a:schemeClr val="tx1"/>
+              </a:solidFill>
+              <a:latin typeface="Times New Roman" panose="02020603050405020304" pitchFamily="18" charset="0"/>
+              <a:cs typeface="Times New Roman" panose="02020603050405020304" pitchFamily="18" charset="0"/>
+            </a:endParaRPr>
+          </a:p>
+          <a:p>
+            <a:pPr marL="0" indent="0" algn="just">
+              <a:buNone/>
+            </a:pPr>
+            <a:endParaRPr lang="pt-BR" sz="2000" dirty="0">
+              <a:solidFill>
+                <a:schemeClr val="tx1"/>
+              </a:solidFill>
+              <a:latin typeface="Times New Roman" panose="02020603050405020304" pitchFamily="18" charset="0"/>
+              <a:cs typeface="Times New Roman" panose="02020603050405020304" pitchFamily="18" charset="0"/>
+            </a:endParaRPr>
+          </a:p>
+        </p:txBody>
+      </p:sp>
+      <p:pic>
+        <p:nvPicPr>
+          <p:cNvPr id="4" name="Gráfico 3">
+            <a:extLst>
+              <a:ext uri="{FF2B5EF4-FFF2-40B4-BE49-F238E27FC236}">
+                <a16:creationId xmlns:a16="http://schemas.microsoft.com/office/drawing/2014/main" id="{02F26215-4980-4106-51E9-B95257E48BEF}"/>
+              </a:ext>
+            </a:extLst>
+          </p:cNvPr>
+          <p:cNvPicPr>
+            <a:picLocks noChangeAspect="1"/>
+          </p:cNvPicPr>
+          <p:nvPr/>
+        </p:nvPicPr>
+        <p:blipFill>
+          <a:blip r:embed="rId3">
+            <a:extLst>
+              <a:ext uri="{28A0092B-C50C-407E-A947-70E740481C1C}">
+                <a14:useLocalDpi xmlns:a14="http://schemas.microsoft.com/office/drawing/2010/main" val="0"/>
+              </a:ext>
+              <a:ext uri="{96DAC541-7B7A-43D3-8B79-37D633B846F1}">
+                <asvg:svgBlip xmlns:asvg="http://schemas.microsoft.com/office/drawing/2016/SVG/main" r:embed="rId4"/>
+              </a:ext>
+            </a:extLst>
+          </a:blip>
+          <a:stretch>
+            <a:fillRect/>
+          </a:stretch>
+        </p:blipFill>
+        <p:spPr>
+          <a:xfrm>
+            <a:off x="1310425" y="1032074"/>
+            <a:ext cx="6523149" cy="3905446"/>
+          </a:xfrm>
+          <a:prstGeom prst="rect">
+            <a:avLst/>
+          </a:prstGeom>
+        </p:spPr>
+      </p:pic>
+      <p:sp>
+        <p:nvSpPr>
+          <p:cNvPr id="7" name="CaixaDeTexto 6">
+            <a:extLst>
+              <a:ext uri="{FF2B5EF4-FFF2-40B4-BE49-F238E27FC236}">
+                <a16:creationId xmlns:a16="http://schemas.microsoft.com/office/drawing/2014/main" id="{753390A1-D3C7-2DD4-A890-1E11BD011BBD}"/>
+              </a:ext>
+            </a:extLst>
+          </p:cNvPr>
+          <p:cNvSpPr txBox="1"/>
+          <p:nvPr/>
+        </p:nvSpPr>
+        <p:spPr>
+          <a:xfrm>
+            <a:off x="142865" y="1063231"/>
+            <a:ext cx="2349500" cy="369332"/>
+          </a:xfrm>
+          <a:prstGeom prst="rect">
+            <a:avLst/>
+          </a:prstGeom>
+          <a:noFill/>
+          <a:ln w="12700" cap="flat">
+            <a:noFill/>
+            <a:miter lim="400000"/>
+          </a:ln>
+          <a:effectLst/>
+        </p:spPr>
+        <p:style>
+          <a:lnRef idx="0">
+            <a:scrgbClr r="0" g="0" b="0"/>
+          </a:lnRef>
+          <a:fillRef idx="0">
+            <a:scrgbClr r="0" g="0" b="0"/>
+          </a:fillRef>
+          <a:effectRef idx="0">
+            <a:scrgbClr r="0" g="0" b="0"/>
+          </a:effectRef>
+          <a:fontRef idx="none"/>
+        </p:style>
+        <p:txBody>
+          <a:bodyPr wrap="square">
+            <a:spAutoFit/>
+          </a:bodyPr>
+          <a:lstStyle/>
+          <a:p>
+            <a:pPr marL="0" indent="0" algn="just">
+              <a:buNone/>
+            </a:pPr>
+            <a:r>
+              <a:rPr lang="pt-BR" sz="1800" b="1" dirty="0">
+                <a:solidFill>
+                  <a:srgbClr val="FF0000"/>
+                </a:solidFill>
                 <a:latin typeface="Times New Roman" panose="02020603050405020304" pitchFamily="18" charset="0"/>
                 <a:cs typeface="Times New Roman" panose="02020603050405020304" pitchFamily="18" charset="0"/>
               </a:rPr>
-              <a:t>	</a:t>
-            </a:r>
-            <a:r>
-              <a:rPr lang="pt-BR" sz="2400" dirty="0">
-                <a:latin typeface="Times New Roman" panose="02020603050405020304" pitchFamily="18" charset="0"/>
-                <a:cs typeface="Times New Roman" panose="02020603050405020304" pitchFamily="18" charset="0"/>
-              </a:rPr>
-              <a:t>Exercícios (Atividade Verificadora de Aprendizagem)</a:t>
-            </a:r>
-          </a:p>
-          <a:p>
-            <a:pPr marL="0" indent="0" algn="just">
-              <a:buNone/>
-            </a:pPr>
-            <a:r>
-              <a:rPr lang="pt-BR" dirty="0">
-                <a:latin typeface="Times New Roman" panose="02020603050405020304" pitchFamily="18" charset="0"/>
-                <a:cs typeface="Times New Roman" panose="02020603050405020304" pitchFamily="18" charset="0"/>
-              </a:rPr>
-              <a:t> </a:t>
-            </a:r>
-            <a:r>
-              <a:rPr lang="pt-BR" sz="2400" dirty="0">
-                <a:latin typeface="Times New Roman" panose="02020603050405020304" pitchFamily="18" charset="0"/>
-                <a:cs typeface="Times New Roman" panose="02020603050405020304" pitchFamily="18" charset="0"/>
-              </a:rPr>
-              <a:t>	</a:t>
-            </a:r>
-          </a:p>
-          <a:p>
-            <a:pPr marL="0" indent="0" algn="just">
-              <a:buNone/>
-            </a:pPr>
-            <a:endParaRPr lang="pt-BR" sz="2000" dirty="0">
-              <a:latin typeface="Calibri" panose="020F0502020204030204" pitchFamily="34" charset="0"/>
-            </a:endParaRPr>
+              <a:t>Fontes de Big Data</a:t>
+            </a:r>
           </a:p>
         </p:txBody>
       </p:sp>
     </p:spTree>
     <p:extLst>
       <p:ext uri="{BB962C8B-B14F-4D97-AF65-F5344CB8AC3E}">
-        <p14:creationId xmlns:p14="http://schemas.microsoft.com/office/powerpoint/2010/main" val="2470652989"/>
+        <p14:creationId xmlns:p14="http://schemas.microsoft.com/office/powerpoint/2010/main" val="1882043041"/>
       </p:ext>
     </p:extLst>
   </p:cSld>
@@ -4984,7 +6570,7 @@
         </p:spPr>
         <p:txBody>
           <a:bodyPr>
-            <a:normAutofit/>
+            <a:normAutofit fontScale="90000"/>
           </a:bodyPr>
           <a:lstStyle/>
           <a:p>
@@ -4994,7 +6580,7 @@
                   <a:srgbClr val="0070C0"/>
                 </a:solidFill>
               </a:rPr>
-              <a:t>Referências</a:t>
+              <a:t>Armazenamento</a:t>
             </a:r>
             <a:r>
               <a:rPr lang="en-US" b="1" dirty="0">
@@ -5002,7 +6588,7 @@
                   <a:srgbClr val="0070C0"/>
                 </a:solidFill>
               </a:rPr>
-              <a:t> </a:t>
+              <a:t> e </a:t>
             </a:r>
             <a:r>
               <a:rPr lang="en-US" b="1" dirty="0" err="1">
@@ -5010,13 +6596,16 @@
                   <a:srgbClr val="0070C0"/>
                 </a:solidFill>
               </a:rPr>
-              <a:t>Bibliográficas</a:t>
-            </a:r>
-            <a:endParaRPr lang="en-US" b="1" dirty="0">
-              <a:solidFill>
-                <a:srgbClr val="0070C0"/>
-              </a:solidFill>
-            </a:endParaRPr>
+              <a:t>Gestão</a:t>
+            </a:r>
+            <a:r>
+              <a:rPr lang="en-US" b="1" dirty="0">
+                <a:solidFill>
+                  <a:srgbClr val="0070C0"/>
+                </a:solidFill>
+              </a:rPr>
+              <a:t> de Dados</a:t>
+            </a:r>
           </a:p>
         </p:txBody>
       </p:sp>
@@ -5032,8 +6621,8 @@
         </p:nvSpPr>
         <p:spPr>
           <a:xfrm>
-            <a:off x="142865" y="1200151"/>
-            <a:ext cx="8865056" cy="3394472"/>
+            <a:off x="142865" y="1200150"/>
+            <a:ext cx="8865056" cy="3737370"/>
           </a:xfrm>
         </p:spPr>
         <p:txBody>
@@ -5045,19 +6634,24 @@
             <a:pPr marL="0" indent="0" algn="just">
               <a:buNone/>
             </a:pPr>
-            <a:r>
-              <a:rPr lang="pt-BR" sz="1800" dirty="0">
-                <a:latin typeface="Calibri" panose="020F0502020204030204" pitchFamily="34" charset="0"/>
-              </a:rPr>
-              <a:t>[1] ...</a:t>
-            </a:r>
+            <a:endParaRPr lang="pt-BR" sz="2000" dirty="0">
+              <a:solidFill>
+                <a:schemeClr val="tx1"/>
+              </a:solidFill>
+              <a:latin typeface="Times New Roman" panose="02020603050405020304" pitchFamily="18" charset="0"/>
+              <a:cs typeface="Times New Roman" panose="02020603050405020304" pitchFamily="18" charset="0"/>
+            </a:endParaRPr>
           </a:p>
           <a:p>
             <a:pPr marL="0" indent="0" algn="just">
               <a:buNone/>
             </a:pPr>
-            <a:endParaRPr lang="pt-BR" sz="1800" dirty="0">
-              <a:latin typeface="Calibri" panose="020F0502020204030204" pitchFamily="34" charset="0"/>
+            <a:endParaRPr lang="pt-BR" sz="2000" dirty="0">
+              <a:solidFill>
+                <a:schemeClr val="tx1"/>
+              </a:solidFill>
+              <a:latin typeface="Times New Roman" panose="02020603050405020304" pitchFamily="18" charset="0"/>
+              <a:cs typeface="Times New Roman" panose="02020603050405020304" pitchFamily="18" charset="0"/>
             </a:endParaRPr>
           </a:p>
           <a:p>
@@ -5065,18 +6659,47 @@
               <a:buNone/>
             </a:pPr>
             <a:r>
-              <a:rPr lang="pt-BR" sz="1800" dirty="0">
-                <a:latin typeface="Calibri" panose="020F0502020204030204" pitchFamily="34" charset="0"/>
-              </a:rPr>
-              <a:t>[2] ...</a:t>
+              <a:rPr lang="pt-BR" sz="2000" b="1" dirty="0">
+                <a:solidFill>
+                  <a:srgbClr val="FF0000"/>
+                </a:solidFill>
+                <a:latin typeface="Times New Roman" panose="02020603050405020304" pitchFamily="18" charset="0"/>
+                <a:cs typeface="Times New Roman" panose="02020603050405020304" pitchFamily="18" charset="0"/>
+              </a:rPr>
+              <a:t>Mapa Mental Big Data</a:t>
             </a:r>
           </a:p>
           <a:p>
             <a:pPr marL="0" indent="0" algn="just">
               <a:buNone/>
             </a:pPr>
-            <a:endParaRPr lang="pt-BR" sz="1800" dirty="0">
-              <a:latin typeface="Calibri" panose="020F0502020204030204" pitchFamily="34" charset="0"/>
+            <a:r>
+              <a:rPr lang="pt-BR" sz="2000" dirty="0">
+                <a:solidFill>
+                  <a:schemeClr val="tx1"/>
+                </a:solidFill>
+                <a:latin typeface="Times New Roman" panose="02020603050405020304" pitchFamily="18" charset="0"/>
+                <a:cs typeface="Times New Roman" panose="02020603050405020304" pitchFamily="18" charset="0"/>
+              </a:rPr>
+              <a:t>		</a:t>
+            </a:r>
+            <a:r>
+              <a:rPr lang="pt-BR" sz="2000" dirty="0">
+                <a:solidFill>
+                  <a:schemeClr val="tx1"/>
+                </a:solidFill>
+                <a:latin typeface="Times New Roman" panose="02020603050405020304" pitchFamily="18" charset="0"/>
+                <a:cs typeface="Times New Roman" panose="02020603050405020304" pitchFamily="18" charset="0"/>
+                <a:hlinkClick r:id="rId3"/>
+              </a:rPr>
+              <a:t>https://coggle.it/diagram/YkOVQObuShO25azi/t/t%C3%B3picos-de-big-data-em-python</a:t>
+            </a:r>
+            <a:endParaRPr lang="pt-BR" sz="2000" dirty="0">
+              <a:solidFill>
+                <a:schemeClr val="tx1"/>
+              </a:solidFill>
+              <a:latin typeface="Times New Roman" panose="02020603050405020304" pitchFamily="18" charset="0"/>
+              <a:cs typeface="Times New Roman" panose="02020603050405020304" pitchFamily="18" charset="0"/>
             </a:endParaRPr>
           </a:p>
         </p:txBody>
@@ -5084,7 +6707,7 @@
     </p:spTree>
     <p:extLst>
       <p:ext uri="{BB962C8B-B14F-4D97-AF65-F5344CB8AC3E}">
-        <p14:creationId xmlns:p14="http://schemas.microsoft.com/office/powerpoint/2010/main" val="1115311843"/>
+        <p14:creationId xmlns:p14="http://schemas.microsoft.com/office/powerpoint/2010/main" val="4092584101"/>
       </p:ext>
     </p:extLst>
   </p:cSld>
@@ -5112,67 +6735,9 @@
           <a:chExt cx="0" cy="0"/>
         </a:xfrm>
       </p:grpSpPr>
-      <p:pic>
-        <p:nvPicPr>
-          <p:cNvPr id="112" name="Picture 6" descr="Picture 6"/>
-          <p:cNvPicPr>
-            <a:picLocks noChangeAspect="1"/>
-          </p:cNvPicPr>
-          <p:nvPr/>
-        </p:nvPicPr>
-        <p:blipFill>
-          <a:blip r:embed="rId2"/>
-          <a:stretch>
-            <a:fillRect/>
-          </a:stretch>
-        </p:blipFill>
-        <p:spPr>
-          <a:xfrm>
-            <a:off x="0" y="0"/>
-            <a:ext cx="9144000" cy="5143500"/>
-          </a:xfrm>
-          <a:prstGeom prst="rect">
-            <a:avLst/>
-          </a:prstGeom>
-          <a:ln w="12700">
-            <a:miter lim="400000"/>
-            <a:headEnd/>
-            <a:tailEnd/>
-          </a:ln>
-        </p:spPr>
-      </p:pic>
-      <p:pic>
-        <p:nvPicPr>
-          <p:cNvPr id="114" name="Picture 5" descr="Picture 5"/>
-          <p:cNvPicPr>
-            <a:picLocks noChangeAspect="1"/>
-          </p:cNvPicPr>
-          <p:nvPr/>
-        </p:nvPicPr>
-        <p:blipFill>
-          <a:blip r:embed="rId3"/>
-          <a:stretch>
-            <a:fillRect/>
-          </a:stretch>
-        </p:blipFill>
-        <p:spPr>
-          <a:xfrm>
-            <a:off x="469900" y="0"/>
-            <a:ext cx="4391984" cy="171450"/>
-          </a:xfrm>
-          <a:prstGeom prst="rect">
-            <a:avLst/>
-          </a:prstGeom>
-          <a:ln w="12700">
-            <a:miter lim="400000"/>
-            <a:headEnd/>
-            <a:tailEnd/>
-          </a:ln>
-        </p:spPr>
-      </p:pic>
       <p:sp>
         <p:nvSpPr>
-          <p:cNvPr id="3" name="Título 2"/>
+          <p:cNvPr id="6" name="Title 1"/>
           <p:cNvSpPr>
             <a:spLocks noGrp="1"/>
           </p:cNvSpPr>
@@ -5182,8 +6747,49 @@
         </p:nvSpPr>
         <p:spPr>
           <a:xfrm>
-            <a:off x="285751" y="2386770"/>
-            <a:ext cx="8615364" cy="1102519"/>
+            <a:off x="457200" y="205980"/>
+            <a:ext cx="8229600" cy="857251"/>
+          </a:xfrm>
+        </p:spPr>
+        <p:txBody>
+          <a:bodyPr>
+            <a:normAutofit/>
+          </a:bodyPr>
+          <a:lstStyle/>
+          <a:p>
+            <a:r>
+              <a:rPr lang="en-US" b="1" dirty="0" err="1">
+                <a:solidFill>
+                  <a:srgbClr val="0070C0"/>
+                </a:solidFill>
+              </a:rPr>
+              <a:t>Bibliotecas</a:t>
+            </a:r>
+            <a:r>
+              <a:rPr lang="en-US" b="1" dirty="0">
+                <a:solidFill>
+                  <a:srgbClr val="0070C0"/>
+                </a:solidFill>
+              </a:rPr>
+              <a:t> Python Data Science</a:t>
+            </a:r>
+          </a:p>
+        </p:txBody>
+      </p:sp>
+      <p:sp>
+        <p:nvSpPr>
+          <p:cNvPr id="8" name="Text Placeholder 2"/>
+          <p:cNvSpPr>
+            <a:spLocks noGrp="1"/>
+          </p:cNvSpPr>
+          <p:nvPr>
+            <p:ph type="body" sz="half" idx="1"/>
+          </p:nvPr>
+        </p:nvSpPr>
+        <p:spPr>
+          <a:xfrm>
+            <a:off x="142865" y="1200150"/>
+            <a:ext cx="8865056" cy="3737370"/>
           </a:xfrm>
         </p:spPr>
         <p:txBody>
@@ -5192,356 +6798,401 @@
           </a:bodyPr>
           <a:lstStyle/>
           <a:p>
-            <a:r>
-              <a:rPr lang="pt-BR" sz="4800" b="1" dirty="0">
-                <a:solidFill>
-                  <a:schemeClr val="bg1"/>
-                </a:solidFill>
-              </a:rPr>
-              <a:t>Python Big Data</a:t>
-            </a:r>
+            <a:pPr marL="0" indent="0" algn="just">
+              <a:buNone/>
+            </a:pPr>
+            <a:endParaRPr lang="pt-BR" sz="2000" dirty="0">
+              <a:solidFill>
+                <a:schemeClr val="tx1"/>
+              </a:solidFill>
+              <a:latin typeface="Times New Roman" panose="02020603050405020304" pitchFamily="18" charset="0"/>
+              <a:cs typeface="Times New Roman" panose="02020603050405020304" pitchFamily="18" charset="0"/>
+            </a:endParaRPr>
+          </a:p>
+          <a:p>
+            <a:pPr marL="0" indent="0" algn="just">
+              <a:buNone/>
+            </a:pPr>
+            <a:r>
+              <a:rPr lang="pt-BR" sz="2000" dirty="0">
+                <a:solidFill>
+                  <a:schemeClr val="tx1"/>
+                </a:solidFill>
+                <a:latin typeface="Times New Roman" panose="02020603050405020304" pitchFamily="18" charset="0"/>
+                <a:cs typeface="Times New Roman" panose="02020603050405020304" pitchFamily="18" charset="0"/>
+              </a:rPr>
+              <a:t>	</a:t>
+            </a:r>
+            <a:r>
+              <a:rPr lang="pt-BR" sz="2000" dirty="0">
+                <a:solidFill>
+                  <a:schemeClr val="tx1"/>
+                </a:solidFill>
+                <a:latin typeface="Times New Roman" panose="02020603050405020304" pitchFamily="18" charset="0"/>
+                <a:cs typeface="Times New Roman" panose="02020603050405020304" pitchFamily="18" charset="0"/>
+                <a:hlinkClick r:id="rId3"/>
+              </a:rPr>
+              <a:t>https://paulovasconcellos.com.br/10-bibliotecas-de-data-science-para-python-que-ningu%C3%A9m-te-conta-706ec3c4fcef</a:t>
+            </a:r>
+            <a:r>
+              <a:rPr lang="pt-BR" sz="2000" dirty="0">
+                <a:solidFill>
+                  <a:schemeClr val="tx1"/>
+                </a:solidFill>
+                <a:latin typeface="Times New Roman" panose="02020603050405020304" pitchFamily="18" charset="0"/>
+                <a:cs typeface="Times New Roman" panose="02020603050405020304" pitchFamily="18" charset="0"/>
+              </a:rPr>
+              <a:t>  </a:t>
+            </a:r>
+          </a:p>
+          <a:p>
+            <a:pPr marL="0" indent="0" algn="just">
+              <a:buNone/>
+            </a:pPr>
+            <a:endParaRPr lang="pt-BR" sz="2000" dirty="0">
+              <a:solidFill>
+                <a:schemeClr val="tx1"/>
+              </a:solidFill>
+              <a:latin typeface="Times New Roman" panose="02020603050405020304" pitchFamily="18" charset="0"/>
+              <a:cs typeface="Times New Roman" panose="02020603050405020304" pitchFamily="18" charset="0"/>
+            </a:endParaRPr>
+          </a:p>
+          <a:p>
+            <a:pPr marL="0" indent="0" algn="just">
+              <a:buNone/>
+            </a:pPr>
+            <a:r>
+              <a:rPr lang="pt-BR" sz="2000" dirty="0">
+                <a:solidFill>
+                  <a:schemeClr val="tx1"/>
+                </a:solidFill>
+                <a:latin typeface="Times New Roman" panose="02020603050405020304" pitchFamily="18" charset="0"/>
+                <a:cs typeface="Times New Roman" panose="02020603050405020304" pitchFamily="18" charset="0"/>
+              </a:rPr>
+              <a:t>	</a:t>
+            </a:r>
+            <a:r>
+              <a:rPr lang="pt-BR" sz="2000" dirty="0">
+                <a:solidFill>
+                  <a:schemeClr val="tx1"/>
+                </a:solidFill>
+                <a:latin typeface="Times New Roman" panose="02020603050405020304" pitchFamily="18" charset="0"/>
+                <a:cs typeface="Times New Roman" panose="02020603050405020304" pitchFamily="18" charset="0"/>
+                <a:hlinkClick r:id="rId4"/>
+              </a:rPr>
+              <a:t>https://cognitiveclass.ai/</a:t>
+            </a:r>
+            <a:r>
+              <a:rPr lang="pt-BR" sz="2000" dirty="0">
+                <a:solidFill>
+                  <a:schemeClr val="tx1"/>
+                </a:solidFill>
+                <a:latin typeface="Times New Roman" panose="02020603050405020304" pitchFamily="18" charset="0"/>
+                <a:cs typeface="Times New Roman" panose="02020603050405020304" pitchFamily="18" charset="0"/>
+              </a:rPr>
+              <a:t> </a:t>
+            </a:r>
+          </a:p>
+          <a:p>
+            <a:pPr marL="0" indent="0" algn="just">
+              <a:buNone/>
+            </a:pPr>
+            <a:endParaRPr lang="pt-BR" sz="2000" dirty="0">
+              <a:solidFill>
+                <a:schemeClr val="tx1"/>
+              </a:solidFill>
+              <a:latin typeface="Times New Roman" panose="02020603050405020304" pitchFamily="18" charset="0"/>
+              <a:cs typeface="Times New Roman" panose="02020603050405020304" pitchFamily="18" charset="0"/>
+            </a:endParaRPr>
+          </a:p>
+          <a:p>
+            <a:pPr marL="0" indent="0" algn="just">
+              <a:buNone/>
+            </a:pPr>
+            <a:r>
+              <a:rPr lang="pt-BR" sz="2000" dirty="0">
+                <a:solidFill>
+                  <a:schemeClr val="tx1"/>
+                </a:solidFill>
+                <a:latin typeface="Times New Roman" panose="02020603050405020304" pitchFamily="18" charset="0"/>
+                <a:cs typeface="Times New Roman" panose="02020603050405020304" pitchFamily="18" charset="0"/>
+              </a:rPr>
+              <a:t>	</a:t>
+            </a:r>
+            <a:r>
+              <a:rPr lang="pt-BR" sz="2000" dirty="0">
+                <a:solidFill>
+                  <a:schemeClr val="tx1"/>
+                </a:solidFill>
+                <a:latin typeface="Times New Roman" panose="02020603050405020304" pitchFamily="18" charset="0"/>
+                <a:cs typeface="Times New Roman" panose="02020603050405020304" pitchFamily="18" charset="0"/>
+                <a:hlinkClick r:id="rId5"/>
+              </a:rPr>
+              <a:t>https://www.kaggle.com/datasets</a:t>
+            </a:r>
+            <a:r>
+              <a:rPr lang="pt-BR" sz="2000" dirty="0">
+                <a:solidFill>
+                  <a:schemeClr val="tx1"/>
+                </a:solidFill>
+                <a:latin typeface="Times New Roman" panose="02020603050405020304" pitchFamily="18" charset="0"/>
+                <a:cs typeface="Times New Roman" panose="02020603050405020304" pitchFamily="18" charset="0"/>
+              </a:rPr>
+              <a:t> </a:t>
+            </a:r>
+          </a:p>
+        </p:txBody>
+      </p:sp>
+    </p:spTree>
+    <p:extLst>
+      <p:ext uri="{BB962C8B-B14F-4D97-AF65-F5344CB8AC3E}">
+        <p14:creationId xmlns:p14="http://schemas.microsoft.com/office/powerpoint/2010/main" val="2389544116"/>
+      </p:ext>
+    </p:extLst>
+  </p:cSld>
+  <p:clrMapOvr>
+    <a:masterClrMapping/>
+  </p:clrMapOvr>
+  <p:transition spd="med"/>
+</p:sld>
+</file>
+
+<file path=ppt/slides/slide9.xml><?xml version="1.0" encoding="utf-8"?>
+<p:sld xmlns:a="http://schemas.openxmlformats.org/drawingml/2006/main" xmlns:r="http://schemas.openxmlformats.org/officeDocument/2006/relationships" xmlns:p="http://schemas.openxmlformats.org/presentationml/2006/main">
+  <p:cSld>
+    <p:spTree>
+      <p:nvGrpSpPr>
+        <p:cNvPr id="1" name=""/>
+        <p:cNvGrpSpPr/>
+        <p:nvPr/>
+      </p:nvGrpSpPr>
+      <p:grpSpPr>
+        <a:xfrm>
+          <a:off x="0" y="0"/>
+          <a:ext cx="0" cy="0"/>
+          <a:chOff x="0" y="0"/>
+          <a:chExt cx="0" cy="0"/>
+        </a:xfrm>
+      </p:grpSpPr>
+      <p:sp>
+        <p:nvSpPr>
+          <p:cNvPr id="6" name="Title 1"/>
+          <p:cNvSpPr>
+            <a:spLocks noGrp="1"/>
+          </p:cNvSpPr>
+          <p:nvPr>
+            <p:ph type="title"/>
+          </p:nvPr>
+        </p:nvSpPr>
+        <p:spPr>
+          <a:xfrm>
+            <a:off x="457200" y="205980"/>
+            <a:ext cx="8229600" cy="857251"/>
+          </a:xfrm>
+        </p:spPr>
+        <p:txBody>
+          <a:bodyPr>
+            <a:normAutofit/>
+          </a:bodyPr>
+          <a:lstStyle/>
+          <a:p>
+            <a:r>
+              <a:rPr lang="en-US" b="1" dirty="0" err="1">
+                <a:solidFill>
+                  <a:srgbClr val="0070C0"/>
+                </a:solidFill>
+              </a:rPr>
+              <a:t>Leitura</a:t>
+            </a:r>
+            <a:r>
+              <a:rPr lang="en-US" b="1" dirty="0">
+                <a:solidFill>
+                  <a:srgbClr val="0070C0"/>
+                </a:solidFill>
+              </a:rPr>
+              <a:t> </a:t>
+            </a:r>
+            <a:r>
+              <a:rPr lang="en-US" b="1" dirty="0" err="1">
+                <a:solidFill>
+                  <a:srgbClr val="0070C0"/>
+                </a:solidFill>
+              </a:rPr>
+              <a:t>Específica</a:t>
+            </a:r>
+            <a:endParaRPr lang="en-US" b="1" dirty="0">
+              <a:solidFill>
+                <a:srgbClr val="0070C0"/>
+              </a:solidFill>
+            </a:endParaRPr>
           </a:p>
         </p:txBody>
       </p:sp>
       <p:sp>
         <p:nvSpPr>
-          <p:cNvPr id="6" name="Título 2"/>
-          <p:cNvSpPr txBox="1"/>
-          <p:nvPr/>
+          <p:cNvPr id="8" name="Text Placeholder 2"/>
+          <p:cNvSpPr>
+            <a:spLocks noGrp="1"/>
+          </p:cNvSpPr>
+          <p:nvPr>
+            <p:ph type="body" sz="half" idx="1"/>
+          </p:nvPr>
         </p:nvSpPr>
         <p:spPr>
           <a:xfrm>
-            <a:off x="975683" y="3866663"/>
-            <a:ext cx="7772400" cy="1102519"/>
+            <a:off x="142865" y="1200150"/>
+            <a:ext cx="8865056" cy="3737369"/>
           </a:xfrm>
-          <a:prstGeom prst="rect">
-            <a:avLst/>
-          </a:prstGeom>
-          <a:ln w="12700">
-            <a:miter lim="400000"/>
-          </a:ln>
         </p:spPr>
         <p:txBody>
-          <a:bodyPr lIns="45718" tIns="45718" rIns="45718" bIns="45718" anchor="ctr">
+          <a:bodyPr>
             <a:noAutofit/>
           </a:bodyPr>
-          <a:lstStyle>
-            <a:lvl1pPr marL="0" marR="0" indent="0" algn="ctr" defTabSz="457200" rtl="0" latinLnBrk="0">
-              <a:lnSpc>
-                <a:spcPct val="100000"/>
-              </a:lnSpc>
-              <a:spcBef>
-                <a:spcPts val="0"/>
-              </a:spcBef>
-              <a:spcAft>
-                <a:spcPts val="0"/>
-              </a:spcAft>
-              <a:buClrTx/>
-              <a:buSzTx/>
-              <a:buFontTx/>
-              <a:buNone/>
-              <a:defRPr sz="4400" b="0" i="0" u="none" strike="noStrike" cap="none" spc="0" baseline="0">
-                <a:ln>
-                  <a:noFill/>
-                </a:ln>
-                <a:solidFill>
-                  <a:srgbClr val="000000"/>
-                </a:solidFill>
-                <a:uFillTx/>
-                <a:latin typeface="+mj-lt"/>
-                <a:ea typeface="+mj-ea"/>
-                <a:cs typeface="+mj-cs"/>
-                <a:sym typeface="Calibri"/>
-              </a:defRPr>
-            </a:lvl1pPr>
-            <a:lvl2pPr marL="0" marR="0" indent="0" algn="ctr" defTabSz="457200" rtl="0" latinLnBrk="0">
-              <a:lnSpc>
-                <a:spcPct val="100000"/>
-              </a:lnSpc>
-              <a:spcBef>
-                <a:spcPts val="0"/>
-              </a:spcBef>
-              <a:spcAft>
-                <a:spcPts val="0"/>
-              </a:spcAft>
-              <a:buClrTx/>
-              <a:buSzTx/>
-              <a:buFontTx/>
-              <a:buNone/>
-              <a:defRPr sz="4400" b="0" i="0" u="none" strike="noStrike" cap="none" spc="0" baseline="0">
-                <a:ln>
-                  <a:noFill/>
-                </a:ln>
-                <a:solidFill>
-                  <a:srgbClr val="000000"/>
-                </a:solidFill>
-                <a:uFillTx/>
-                <a:latin typeface="+mj-lt"/>
-                <a:ea typeface="+mj-ea"/>
-                <a:cs typeface="+mj-cs"/>
-                <a:sym typeface="Calibri"/>
-              </a:defRPr>
-            </a:lvl2pPr>
-            <a:lvl3pPr marL="0" marR="0" indent="0" algn="ctr" defTabSz="457200" rtl="0" latinLnBrk="0">
-              <a:lnSpc>
-                <a:spcPct val="100000"/>
-              </a:lnSpc>
-              <a:spcBef>
-                <a:spcPts val="0"/>
-              </a:spcBef>
-              <a:spcAft>
-                <a:spcPts val="0"/>
-              </a:spcAft>
-              <a:buClrTx/>
-              <a:buSzTx/>
-              <a:buFontTx/>
-              <a:buNone/>
-              <a:defRPr sz="4400" b="0" i="0" u="none" strike="noStrike" cap="none" spc="0" baseline="0">
-                <a:ln>
-                  <a:noFill/>
-                </a:ln>
-                <a:solidFill>
-                  <a:srgbClr val="000000"/>
-                </a:solidFill>
-                <a:uFillTx/>
-                <a:latin typeface="+mj-lt"/>
-                <a:ea typeface="+mj-ea"/>
-                <a:cs typeface="+mj-cs"/>
-                <a:sym typeface="Calibri"/>
-              </a:defRPr>
-            </a:lvl3pPr>
-            <a:lvl4pPr marL="0" marR="0" indent="0" algn="ctr" defTabSz="457200" rtl="0" latinLnBrk="0">
-              <a:lnSpc>
-                <a:spcPct val="100000"/>
-              </a:lnSpc>
-              <a:spcBef>
-                <a:spcPts val="0"/>
-              </a:spcBef>
-              <a:spcAft>
-                <a:spcPts val="0"/>
-              </a:spcAft>
-              <a:buClrTx/>
-              <a:buSzTx/>
-              <a:buFontTx/>
-              <a:buNone/>
-              <a:defRPr sz="4400" b="0" i="0" u="none" strike="noStrike" cap="none" spc="0" baseline="0">
-                <a:ln>
-                  <a:noFill/>
-                </a:ln>
-                <a:solidFill>
-                  <a:srgbClr val="000000"/>
-                </a:solidFill>
-                <a:uFillTx/>
-                <a:latin typeface="+mj-lt"/>
-                <a:ea typeface="+mj-ea"/>
-                <a:cs typeface="+mj-cs"/>
-                <a:sym typeface="Calibri"/>
-              </a:defRPr>
-            </a:lvl4pPr>
-            <a:lvl5pPr marL="0" marR="0" indent="0" algn="ctr" defTabSz="457200" rtl="0" latinLnBrk="0">
-              <a:lnSpc>
-                <a:spcPct val="100000"/>
-              </a:lnSpc>
-              <a:spcBef>
-                <a:spcPts val="0"/>
-              </a:spcBef>
-              <a:spcAft>
-                <a:spcPts val="0"/>
-              </a:spcAft>
-              <a:buClrTx/>
-              <a:buSzTx/>
-              <a:buFontTx/>
-              <a:buNone/>
-              <a:defRPr sz="4400" b="0" i="0" u="none" strike="noStrike" cap="none" spc="0" baseline="0">
-                <a:ln>
-                  <a:noFill/>
-                </a:ln>
-                <a:solidFill>
-                  <a:srgbClr val="000000"/>
-                </a:solidFill>
-                <a:uFillTx/>
-                <a:latin typeface="+mj-lt"/>
-                <a:ea typeface="+mj-ea"/>
-                <a:cs typeface="+mj-cs"/>
-                <a:sym typeface="Calibri"/>
-              </a:defRPr>
-            </a:lvl5pPr>
-            <a:lvl6pPr marL="0" marR="0" indent="0" algn="ctr" defTabSz="457200" rtl="0" latinLnBrk="0">
-              <a:lnSpc>
-                <a:spcPct val="100000"/>
-              </a:lnSpc>
-              <a:spcBef>
-                <a:spcPts val="0"/>
-              </a:spcBef>
-              <a:spcAft>
-                <a:spcPts val="0"/>
-              </a:spcAft>
-              <a:buClrTx/>
-              <a:buSzTx/>
-              <a:buFontTx/>
-              <a:buNone/>
-              <a:defRPr sz="4400" b="0" i="0" u="none" strike="noStrike" cap="none" spc="0" baseline="0">
-                <a:ln>
-                  <a:noFill/>
-                </a:ln>
-                <a:solidFill>
-                  <a:srgbClr val="000000"/>
-                </a:solidFill>
-                <a:uFillTx/>
-                <a:latin typeface="+mj-lt"/>
-                <a:ea typeface="+mj-ea"/>
-                <a:cs typeface="+mj-cs"/>
-                <a:sym typeface="Calibri"/>
-              </a:defRPr>
-            </a:lvl6pPr>
-            <a:lvl7pPr marL="0" marR="0" indent="0" algn="ctr" defTabSz="457200" rtl="0" latinLnBrk="0">
-              <a:lnSpc>
-                <a:spcPct val="100000"/>
-              </a:lnSpc>
-              <a:spcBef>
-                <a:spcPts val="0"/>
-              </a:spcBef>
-              <a:spcAft>
-                <a:spcPts val="0"/>
-              </a:spcAft>
-              <a:buClrTx/>
-              <a:buSzTx/>
-              <a:buFontTx/>
-              <a:buNone/>
-              <a:defRPr sz="4400" b="0" i="0" u="none" strike="noStrike" cap="none" spc="0" baseline="0">
-                <a:ln>
-                  <a:noFill/>
-                </a:ln>
-                <a:solidFill>
-                  <a:srgbClr val="000000"/>
-                </a:solidFill>
-                <a:uFillTx/>
-                <a:latin typeface="+mj-lt"/>
-                <a:ea typeface="+mj-ea"/>
-                <a:cs typeface="+mj-cs"/>
-                <a:sym typeface="Calibri"/>
-              </a:defRPr>
-            </a:lvl7pPr>
-            <a:lvl8pPr marL="0" marR="0" indent="0" algn="ctr" defTabSz="457200" rtl="0" latinLnBrk="0">
-              <a:lnSpc>
-                <a:spcPct val="100000"/>
-              </a:lnSpc>
-              <a:spcBef>
-                <a:spcPts val="0"/>
-              </a:spcBef>
-              <a:spcAft>
-                <a:spcPts val="0"/>
-              </a:spcAft>
-              <a:buClrTx/>
-              <a:buSzTx/>
-              <a:buFontTx/>
-              <a:buNone/>
-              <a:defRPr sz="4400" b="0" i="0" u="none" strike="noStrike" cap="none" spc="0" baseline="0">
-                <a:ln>
-                  <a:noFill/>
-                </a:ln>
-                <a:solidFill>
-                  <a:srgbClr val="000000"/>
-                </a:solidFill>
-                <a:uFillTx/>
-                <a:latin typeface="+mj-lt"/>
-                <a:ea typeface="+mj-ea"/>
-                <a:cs typeface="+mj-cs"/>
-                <a:sym typeface="Calibri"/>
-              </a:defRPr>
-            </a:lvl8pPr>
-            <a:lvl9pPr marL="0" marR="0" indent="0" algn="ctr" defTabSz="457200" rtl="0" latinLnBrk="0">
-              <a:lnSpc>
-                <a:spcPct val="100000"/>
-              </a:lnSpc>
-              <a:spcBef>
-                <a:spcPts val="0"/>
-              </a:spcBef>
-              <a:spcAft>
-                <a:spcPts val="0"/>
-              </a:spcAft>
-              <a:buClrTx/>
-              <a:buSzTx/>
-              <a:buFontTx/>
-              <a:buNone/>
-              <a:defRPr sz="4400" b="0" i="0" u="none" strike="noStrike" cap="none" spc="0" baseline="0">
-                <a:ln>
-                  <a:noFill/>
-                </a:ln>
-                <a:solidFill>
-                  <a:srgbClr val="000000"/>
-                </a:solidFill>
-                <a:uFillTx/>
-                <a:latin typeface="+mj-lt"/>
-                <a:ea typeface="+mj-ea"/>
-                <a:cs typeface="+mj-cs"/>
-                <a:sym typeface="Calibri"/>
-              </a:defRPr>
-            </a:lvl9pPr>
-          </a:lstStyle>
-          <a:p>
-            <a:pPr algn="r" hangingPunct="1"/>
+          <a:lstStyle/>
+          <a:p>
+            <a:pPr marL="0" indent="0" algn="just">
+              <a:buNone/>
+            </a:pPr>
+            <a:r>
+              <a:rPr lang="pt-BR" sz="2000" dirty="0">
+                <a:latin typeface="Times New Roman" panose="02020603050405020304" pitchFamily="18" charset="0"/>
+                <a:cs typeface="Times New Roman" panose="02020603050405020304" pitchFamily="18" charset="0"/>
+              </a:rPr>
+              <a:t>[1] Artigo Análise de Dados – Python com Pandas.</a:t>
+            </a:r>
+          </a:p>
+          <a:p>
+            <a:pPr marL="0" indent="0" algn="just">
+              <a:buNone/>
+            </a:pPr>
             <a:r>
               <a:rPr lang="pt-BR" sz="2000" b="1" dirty="0">
                 <a:solidFill>
-                  <a:schemeClr val="bg1"/>
-                </a:solidFill>
-              </a:rPr>
-              <a:t>Professor </a:t>
-            </a:r>
-            <a:r>
-              <a:rPr lang="pt-BR" sz="2000" b="1">
-                <a:solidFill>
-                  <a:schemeClr val="bg1"/>
-                </a:solidFill>
-              </a:rPr>
-              <a:t>M.Sc</a:t>
-            </a:r>
+                  <a:srgbClr val="FF0000"/>
+                </a:solidFill>
+                <a:latin typeface="Times New Roman" panose="02020603050405020304" pitchFamily="18" charset="0"/>
+                <a:cs typeface="Times New Roman" panose="02020603050405020304" pitchFamily="18" charset="0"/>
+              </a:rPr>
+              <a:t>Disponível em:</a:t>
+            </a:r>
+          </a:p>
+          <a:p>
+            <a:pPr marL="0" indent="0" algn="just">
+              <a:buNone/>
+            </a:pPr>
             <a:r>
               <a:rPr lang="pt-BR" sz="2000" b="1" dirty="0">
                 <a:solidFill>
-                  <a:schemeClr val="bg1"/>
-                </a:solidFill>
-              </a:rPr>
-              <a:t>. Heleno Cardoso</a:t>
+                  <a:srgbClr val="FF0000"/>
+                </a:solidFill>
+                <a:latin typeface="Times New Roman" panose="02020603050405020304" pitchFamily="18" charset="0"/>
+                <a:cs typeface="Times New Roman" panose="02020603050405020304" pitchFamily="18" charset="0"/>
+              </a:rPr>
+              <a:t> </a:t>
+            </a:r>
+            <a:r>
+              <a:rPr lang="pt-BR" sz="2000" b="1" dirty="0">
+                <a:solidFill>
+                  <a:srgbClr val="FF0000"/>
+                </a:solidFill>
+                <a:latin typeface="Times New Roman" panose="02020603050405020304" pitchFamily="18" charset="0"/>
+                <a:cs typeface="Times New Roman" panose="02020603050405020304" pitchFamily="18" charset="0"/>
+                <a:hlinkClick r:id="rId3"/>
+              </a:rPr>
+              <a:t>https://congresso.fatecmococa.edu.br/index.php/congresso/article/view/169/61</a:t>
+            </a:r>
+            <a:r>
+              <a:rPr lang="pt-BR" sz="2000" b="1" dirty="0">
+                <a:solidFill>
+                  <a:srgbClr val="FF0000"/>
+                </a:solidFill>
+                <a:latin typeface="Times New Roman" panose="02020603050405020304" pitchFamily="18" charset="0"/>
+                <a:cs typeface="Times New Roman" panose="02020603050405020304" pitchFamily="18" charset="0"/>
+              </a:rPr>
+              <a:t> </a:t>
+            </a:r>
+          </a:p>
+          <a:p>
+            <a:pPr marL="0" indent="0" algn="just">
+              <a:buNone/>
+            </a:pPr>
+            <a:endParaRPr lang="pt-BR" sz="2000" dirty="0">
+              <a:latin typeface="Times New Roman" panose="02020603050405020304" pitchFamily="18" charset="0"/>
+              <a:cs typeface="Times New Roman" panose="02020603050405020304" pitchFamily="18" charset="0"/>
+            </a:endParaRPr>
+          </a:p>
+          <a:p>
+            <a:pPr marL="0" indent="0" algn="just">
+              <a:buNone/>
+            </a:pPr>
+            <a:endParaRPr lang="pt-BR" sz="2000" dirty="0">
+              <a:latin typeface="Times New Roman" panose="02020603050405020304" pitchFamily="18" charset="0"/>
+              <a:cs typeface="Times New Roman" panose="02020603050405020304" pitchFamily="18" charset="0"/>
+            </a:endParaRPr>
+          </a:p>
+          <a:p>
+            <a:pPr marL="0" indent="0" algn="just">
+              <a:buNone/>
+            </a:pPr>
+            <a:r>
+              <a:rPr lang="pt-BR" sz="2000" dirty="0">
+                <a:latin typeface="Times New Roman" panose="02020603050405020304" pitchFamily="18" charset="0"/>
+                <a:cs typeface="Times New Roman" panose="02020603050405020304" pitchFamily="18" charset="0"/>
+              </a:rPr>
+              <a:t>[1] Big Data.</a:t>
+            </a:r>
+          </a:p>
+          <a:p>
+            <a:pPr marL="0" indent="0" algn="just">
+              <a:buNone/>
+            </a:pPr>
+            <a:r>
+              <a:rPr lang="pt-BR" sz="2000" b="1" dirty="0">
+                <a:solidFill>
+                  <a:srgbClr val="FF0000"/>
+                </a:solidFill>
+                <a:latin typeface="Times New Roman" panose="02020603050405020304" pitchFamily="18" charset="0"/>
+                <a:cs typeface="Times New Roman" panose="02020603050405020304" pitchFamily="18" charset="0"/>
+              </a:rPr>
+              <a:t>Disponível em:</a:t>
+            </a:r>
+            <a:endParaRPr lang="pt-BR" sz="2000" dirty="0">
+              <a:latin typeface="Times New Roman" panose="02020603050405020304" pitchFamily="18" charset="0"/>
+              <a:cs typeface="Times New Roman" panose="02020603050405020304" pitchFamily="18" charset="0"/>
+            </a:endParaRPr>
+          </a:p>
+          <a:p>
+            <a:pPr marL="0" indent="0" algn="just">
+              <a:buNone/>
+            </a:pPr>
+            <a:r>
+              <a:rPr lang="pt-BR" sz="2000" dirty="0">
+                <a:latin typeface="Calibri" panose="020F0502020204030204" pitchFamily="34" charset="0"/>
+              </a:rPr>
+              <a:t>  </a:t>
+            </a:r>
+            <a:r>
+              <a:rPr lang="pt-BR" sz="2000" dirty="0">
+                <a:latin typeface="Calibri" panose="020F0502020204030204" pitchFamily="34" charset="0"/>
+                <a:hlinkClick r:id="rId4"/>
+              </a:rPr>
+              <a:t>https://www.sap.com/brazil/products/technology-platform/what-is-big-data.html</a:t>
+            </a:r>
+            <a:r>
+              <a:rPr lang="pt-BR" sz="2000" dirty="0">
+                <a:latin typeface="Calibri" panose="020F0502020204030204" pitchFamily="34" charset="0"/>
+              </a:rPr>
+              <a:t> </a:t>
             </a:r>
           </a:p>
         </p:txBody>
       </p:sp>
-      <p:pic>
-        <p:nvPicPr>
-          <p:cNvPr id="2" name="Google Shape;62;p1" descr="Imagem">
-            <a:extLst>
-              <a:ext uri="{FF2B5EF4-FFF2-40B4-BE49-F238E27FC236}">
-                <a16:creationId xmlns:a16="http://schemas.microsoft.com/office/drawing/2014/main" id="{9C895622-2963-024D-634E-EA58F5381D06}"/>
-              </a:ext>
-            </a:extLst>
-          </p:cNvPr>
-          <p:cNvPicPr preferRelativeResize="0"/>
-          <p:nvPr/>
-        </p:nvPicPr>
-        <p:blipFill rotWithShape="1">
-          <a:blip r:embed="rId4">
-            <a:alphaModFix/>
-          </a:blip>
-          <a:srcRect/>
-          <a:stretch/>
-        </p:blipFill>
-        <p:spPr>
-          <a:xfrm>
-            <a:off x="469898" y="343798"/>
-            <a:ext cx="2858518" cy="1338697"/>
-          </a:xfrm>
-          <a:prstGeom prst="rect">
-            <a:avLst/>
-          </a:prstGeom>
-          <a:noFill/>
-          <a:ln>
-            <a:noFill/>
-          </a:ln>
-        </p:spPr>
-      </p:pic>
     </p:spTree>
+    <p:extLst>
+      <p:ext uri="{BB962C8B-B14F-4D97-AF65-F5344CB8AC3E}">
+        <p14:creationId xmlns:p14="http://schemas.microsoft.com/office/powerpoint/2010/main" val="3680270425"/>
+      </p:ext>
+    </p:extLst>
   </p:cSld>
   <p:clrMapOvr>
     <a:masterClrMapping/>

</xml_diff>